<commit_message>
cleaned notebook and added nonGS getArrays
</commit_message>
<xml_diff>
--- a/group_proj/presentations/FinalPresentation.pptx
+++ b/group_proj/presentations/FinalPresentation.pptx
@@ -11,9 +11,9 @@
     <p:sldId id="256" r:id="rId2"/>
     <p:sldId id="280" r:id="rId3"/>
     <p:sldId id="275" r:id="rId4"/>
-    <p:sldId id="269" r:id="rId5"/>
-    <p:sldId id="267" r:id="rId6"/>
-    <p:sldId id="259" r:id="rId7"/>
+    <p:sldId id="259" r:id="rId5"/>
+    <p:sldId id="269" r:id="rId6"/>
+    <p:sldId id="267" r:id="rId7"/>
     <p:sldId id="270" r:id="rId8"/>
     <p:sldId id="272" r:id="rId9"/>
     <p:sldId id="266" r:id="rId10"/>
@@ -212,7 +212,7 @@
           <a:p>
             <a:fld id="{B4F796A9-8EC0-5141-B45F-E32396FCD01A}" type="datetimeFigureOut">
               <a:rPr lang="en-US" smtClean="0"/>
-              <a:t>11/18/2023</a:t>
+              <a:t>11/28/2023</a:t>
             </a:fld>
             <a:endParaRPr lang="en-US"/>
           </a:p>
@@ -479,6 +479,93 @@
 </p:notesMaster>
 </file>
 
+<file path=ppt/notesSlides/notesSlide1.xml><?xml version="1.0" encoding="utf-8"?>
+<p:notes xmlns:a="http://schemas.openxmlformats.org/drawingml/2006/main" xmlns:r="http://schemas.openxmlformats.org/officeDocument/2006/relationships" xmlns:p="http://schemas.openxmlformats.org/presentationml/2006/main">
+  <p:cSld>
+    <p:spTree>
+      <p:nvGrpSpPr>
+        <p:cNvPr id="1" name=""/>
+        <p:cNvGrpSpPr/>
+        <p:nvPr/>
+      </p:nvGrpSpPr>
+      <p:grpSpPr>
+        <a:xfrm>
+          <a:off x="0" y="0"/>
+          <a:ext cx="0" cy="0"/>
+          <a:chOff x="0" y="0"/>
+          <a:chExt cx="0" cy="0"/>
+        </a:xfrm>
+      </p:grpSpPr>
+      <p:sp>
+        <p:nvSpPr>
+          <p:cNvPr id="2" name="Slide Image Placeholder 1"/>
+          <p:cNvSpPr>
+            <a:spLocks noGrp="1" noRot="1" noChangeAspect="1"/>
+          </p:cNvSpPr>
+          <p:nvPr>
+            <p:ph type="sldImg"/>
+          </p:nvPr>
+        </p:nvSpPr>
+        <p:spPr/>
+      </p:sp>
+      <p:sp>
+        <p:nvSpPr>
+          <p:cNvPr id="3" name="Notes Placeholder 2"/>
+          <p:cNvSpPr>
+            <a:spLocks noGrp="1"/>
+          </p:cNvSpPr>
+          <p:nvPr>
+            <p:ph type="body" idx="1"/>
+          </p:nvPr>
+        </p:nvSpPr>
+        <p:spPr/>
+        <p:txBody>
+          <a:bodyPr/>
+          <a:lstStyle/>
+          <a:p>
+            <a:r>
+              <a:rPr lang="en-US" dirty="0"/>
+              <a:t>*Verbatim</a:t>
+            </a:r>
+          </a:p>
+        </p:txBody>
+      </p:sp>
+      <p:sp>
+        <p:nvSpPr>
+          <p:cNvPr id="4" name="Slide Number Placeholder 3"/>
+          <p:cNvSpPr>
+            <a:spLocks noGrp="1"/>
+          </p:cNvSpPr>
+          <p:nvPr>
+            <p:ph type="sldNum" sz="quarter" idx="5"/>
+          </p:nvPr>
+        </p:nvSpPr>
+        <p:spPr/>
+        <p:txBody>
+          <a:bodyPr/>
+          <a:lstStyle/>
+          <a:p>
+            <a:fld id="{4D520EF9-D8CB-814F-BCB7-91B0420377E5}" type="slidenum">
+              <a:rPr lang="en-US" smtClean="0"/>
+              <a:t>4</a:t>
+            </a:fld>
+            <a:endParaRPr lang="en-US"/>
+          </a:p>
+        </p:txBody>
+      </p:sp>
+    </p:spTree>
+    <p:extLst>
+      <p:ext uri="{BB962C8B-B14F-4D97-AF65-F5344CB8AC3E}">
+        <p14:creationId xmlns:p14="http://schemas.microsoft.com/office/powerpoint/2010/main" val="3633973283"/>
+      </p:ext>
+    </p:extLst>
+  </p:cSld>
+  <p:clrMapOvr>
+    <a:masterClrMapping/>
+  </p:clrMapOvr>
+</p:notes>
+</file>
+
 <file path=ppt/slideLayouts/slideLayout1.xml><?xml version="1.0" encoding="utf-8"?>
 <p:sldLayout xmlns:a="http://schemas.openxmlformats.org/drawingml/2006/main" xmlns:r="http://schemas.openxmlformats.org/officeDocument/2006/relationships" xmlns:p="http://schemas.openxmlformats.org/presentationml/2006/main" type="title" preserve="1">
   <p:cSld name="Title Slide">
@@ -642,7 +729,7 @@
           <a:p>
             <a:fld id="{90053C86-C48F-3743-8746-2CA0384683DA}" type="datetimeFigureOut">
               <a:rPr lang="en-US" smtClean="0"/>
-              <a:t>11/18/2023</a:t>
+              <a:t>11/28/2023</a:t>
             </a:fld>
             <a:endParaRPr lang="en-US"/>
           </a:p>
@@ -812,7 +899,7 @@
           <a:p>
             <a:fld id="{90053C86-C48F-3743-8746-2CA0384683DA}" type="datetimeFigureOut">
               <a:rPr lang="en-US" smtClean="0"/>
-              <a:t>11/18/2023</a:t>
+              <a:t>11/28/2023</a:t>
             </a:fld>
             <a:endParaRPr lang="en-US"/>
           </a:p>
@@ -992,7 +1079,7 @@
           <a:p>
             <a:fld id="{90053C86-C48F-3743-8746-2CA0384683DA}" type="datetimeFigureOut">
               <a:rPr lang="en-US" smtClean="0"/>
-              <a:t>11/18/2023</a:t>
+              <a:t>11/28/2023</a:t>
             </a:fld>
             <a:endParaRPr lang="en-US"/>
           </a:p>
@@ -1162,7 +1249,7 @@
           <a:p>
             <a:fld id="{90053C86-C48F-3743-8746-2CA0384683DA}" type="datetimeFigureOut">
               <a:rPr lang="en-US" smtClean="0"/>
-              <a:t>11/18/2023</a:t>
+              <a:t>11/28/2023</a:t>
             </a:fld>
             <a:endParaRPr lang="en-US"/>
           </a:p>
@@ -1430,7 +1517,7 @@
           <a:p>
             <a:fld id="{90053C86-C48F-3743-8746-2CA0384683DA}" type="datetimeFigureOut">
               <a:rPr lang="en-US" smtClean="0"/>
-              <a:t>11/18/2023</a:t>
+              <a:t>11/28/2023</a:t>
             </a:fld>
             <a:endParaRPr lang="en-US"/>
           </a:p>
@@ -1662,7 +1749,7 @@
           <a:p>
             <a:fld id="{90053C86-C48F-3743-8746-2CA0384683DA}" type="datetimeFigureOut">
               <a:rPr lang="en-US" smtClean="0"/>
-              <a:t>11/18/2023</a:t>
+              <a:t>11/28/2023</a:t>
             </a:fld>
             <a:endParaRPr lang="en-US"/>
           </a:p>
@@ -2021,7 +2108,7 @@
           <a:p>
             <a:fld id="{90053C86-C48F-3743-8746-2CA0384683DA}" type="datetimeFigureOut">
               <a:rPr lang="en-US" smtClean="0"/>
-              <a:t>11/18/2023</a:t>
+              <a:t>11/28/2023</a:t>
             </a:fld>
             <a:endParaRPr lang="en-US"/>
           </a:p>
@@ -2162,7 +2249,7 @@
           <a:p>
             <a:fld id="{90053C86-C48F-3743-8746-2CA0384683DA}" type="datetimeFigureOut">
               <a:rPr lang="en-US" smtClean="0"/>
-              <a:t>11/18/2023</a:t>
+              <a:t>11/28/2023</a:t>
             </a:fld>
             <a:endParaRPr lang="en-US"/>
           </a:p>
@@ -2257,7 +2344,7 @@
           <a:p>
             <a:fld id="{90053C86-C48F-3743-8746-2CA0384683DA}" type="datetimeFigureOut">
               <a:rPr lang="en-US" smtClean="0"/>
-              <a:t>11/18/2023</a:t>
+              <a:t>11/28/2023</a:t>
             </a:fld>
             <a:endParaRPr lang="en-US"/>
           </a:p>
@@ -2614,7 +2701,7 @@
           <a:p>
             <a:fld id="{90053C86-C48F-3743-8746-2CA0384683DA}" type="datetimeFigureOut">
               <a:rPr lang="en-US" smtClean="0"/>
-              <a:t>11/18/2023</a:t>
+              <a:t>11/28/2023</a:t>
             </a:fld>
             <a:endParaRPr lang="en-US"/>
           </a:p>
@@ -2971,7 +3058,7 @@
           <a:p>
             <a:fld id="{90053C86-C48F-3743-8746-2CA0384683DA}" type="datetimeFigureOut">
               <a:rPr lang="en-US" smtClean="0"/>
-              <a:t>11/18/2023</a:t>
+              <a:t>11/28/2023</a:t>
             </a:fld>
             <a:endParaRPr lang="en-US"/>
           </a:p>
@@ -3213,7 +3300,7 @@
           <a:p>
             <a:fld id="{90053C86-C48F-3743-8746-2CA0384683DA}" type="datetimeFigureOut">
               <a:rPr lang="en-US" smtClean="0"/>
-              <a:t>11/18/2023</a:t>
+              <a:t>11/28/2023</a:t>
             </a:fld>
             <a:endParaRPr lang="en-US"/>
           </a:p>
@@ -3750,7 +3837,7 @@
           <a:p>
             <a:r>
               <a:rPr lang="en-US" dirty="0"/>
-              <a:t>Cat Image Classification</a:t>
+              <a:t>Animal Image Classification</a:t>
             </a:r>
           </a:p>
         </p:txBody>
@@ -4556,7 +4643,7 @@
 </file>
 
 <file path=ppt/slides/slide2.xml><?xml version="1.0" encoding="utf-8"?>
-<p:sld xmlns:a="http://schemas.openxmlformats.org/drawingml/2006/main" xmlns:r="http://schemas.openxmlformats.org/officeDocument/2006/relationships" xmlns:p="http://schemas.openxmlformats.org/presentationml/2006/main">
+<p:sld xmlns:a="http://schemas.openxmlformats.org/drawingml/2006/main" xmlns:r="http://schemas.openxmlformats.org/officeDocument/2006/relationships" xmlns:p="http://schemas.openxmlformats.org/presentationml/2006/main" show="0">
   <p:cSld>
     <p:spTree>
       <p:nvGrpSpPr>
@@ -4752,59 +4839,94 @@
             <p:ph idx="1"/>
           </p:nvPr>
         </p:nvSpPr>
-        <p:spPr/>
+        <p:spPr>
+          <a:xfrm>
+            <a:off x="2231136" y="2638044"/>
+            <a:ext cx="7729728" cy="4080256"/>
+          </a:xfrm>
+        </p:spPr>
         <p:txBody>
           <a:bodyPr>
-            <a:normAutofit lnSpcReduction="10000"/>
+            <a:normAutofit/>
           </a:bodyPr>
           <a:lstStyle/>
           <a:p>
-            <a:r>
-              <a:rPr lang="en-US" dirty="0"/>
+            <a:pPr marL="457200" indent="-457200">
+              <a:buFont typeface="+mj-lt"/>
+              <a:buAutoNum type="arabicPeriod"/>
+            </a:pPr>
+            <a:r>
+              <a:rPr lang="en-US" sz="2000" dirty="0"/>
+              <a:t>Dataset Overview</a:t>
+            </a:r>
+          </a:p>
+          <a:p>
+            <a:pPr marL="457200" indent="-457200">
+              <a:buFont typeface="+mj-lt"/>
+              <a:buAutoNum type="arabicPeriod"/>
+            </a:pPr>
+            <a:r>
+              <a:rPr lang="en-US" sz="2000" dirty="0"/>
               <a:t>Data Visualization</a:t>
             </a:r>
           </a:p>
           <a:p>
-            <a:r>
-              <a:rPr lang="en-US" dirty="0"/>
+            <a:pPr marL="457200" indent="-457200">
+              <a:buFont typeface="+mj-lt"/>
+              <a:buAutoNum type="arabicPeriod"/>
+            </a:pPr>
+            <a:r>
+              <a:rPr lang="en-US" sz="2000" dirty="0"/>
               <a:t>Data Cleaning</a:t>
             </a:r>
           </a:p>
           <a:p>
-            <a:r>
-              <a:rPr lang="en-US" dirty="0"/>
+            <a:pPr marL="457200" indent="-457200">
+              <a:buFont typeface="+mj-lt"/>
+              <a:buAutoNum type="arabicPeriod"/>
+            </a:pPr>
+            <a:r>
+              <a:rPr lang="en-US" sz="2000" dirty="0"/>
               <a:t>Data Preparation</a:t>
             </a:r>
           </a:p>
           <a:p>
-            <a:r>
-              <a:rPr lang="en-US" dirty="0"/>
+            <a:pPr marL="457200" indent="-457200">
+              <a:buFont typeface="+mj-lt"/>
+              <a:buAutoNum type="arabicPeriod"/>
+            </a:pPr>
+            <a:r>
+              <a:rPr lang="en-US" sz="2000" dirty="0"/>
               <a:t>ML Models:</a:t>
             </a:r>
           </a:p>
           <a:p>
-            <a:pPr lvl="1"/>
-            <a:r>
-              <a:rPr lang="en-US" dirty="0"/>
-              <a:t>SVM – Isaiah</a:t>
-            </a:r>
-          </a:p>
-          <a:p>
-            <a:pPr lvl="1"/>
-            <a:r>
-              <a:rPr lang="en-US" dirty="0"/>
-              <a:t>CNN – Joycelyn</a:t>
-            </a:r>
-          </a:p>
-          <a:p>
-            <a:r>
-              <a:rPr lang="en-US" dirty="0"/>
-              <a:t>Model Evaluation</a:t>
-            </a:r>
-          </a:p>
-          <a:p>
-            <a:r>
-              <a:rPr lang="en-US" dirty="0"/>
+            <a:pPr marL="457200" indent="-457200">
+              <a:buFont typeface="+mj-lt"/>
+              <a:buAutoNum type="arabicPeriod"/>
+            </a:pPr>
+            <a:r>
+              <a:rPr lang="en-US" sz="2000" dirty="0"/>
+              <a:t>Model Evaluation/Comparison</a:t>
+            </a:r>
+          </a:p>
+          <a:p>
+            <a:pPr marL="457200" indent="-457200">
+              <a:buFont typeface="+mj-lt"/>
+              <a:buAutoNum type="arabicPeriod"/>
+            </a:pPr>
+            <a:r>
+              <a:rPr lang="en-US" sz="2000" dirty="0"/>
+              <a:t>Future Work</a:t>
+            </a:r>
+          </a:p>
+          <a:p>
+            <a:pPr marL="457200" indent="-457200">
+              <a:buFont typeface="+mj-lt"/>
+              <a:buAutoNum type="arabicPeriod"/>
+            </a:pPr>
+            <a:r>
+              <a:rPr lang="en-US" sz="2000" dirty="0"/>
               <a:t>Conclusion</a:t>
             </a:r>
           </a:p>
@@ -4845,6 +4967,250 @@
           <p:cNvPr id="2" name="Title 1">
             <a:extLst>
               <a:ext uri="{FF2B5EF4-FFF2-40B4-BE49-F238E27FC236}">
+                <a16:creationId xmlns:a16="http://schemas.microsoft.com/office/drawing/2014/main" id="{7DDD3599-1843-AF4C-3558-E20F8751FD50}"/>
+              </a:ext>
+            </a:extLst>
+          </p:cNvPr>
+          <p:cNvSpPr>
+            <a:spLocks noGrp="1"/>
+          </p:cNvSpPr>
+          <p:nvPr>
+            <p:ph type="title"/>
+          </p:nvPr>
+        </p:nvSpPr>
+        <p:spPr/>
+        <p:txBody>
+          <a:bodyPr/>
+          <a:lstStyle/>
+          <a:p>
+            <a:r>
+              <a:rPr lang="en-US" dirty="0"/>
+              <a:t>Dataset Overview</a:t>
+            </a:r>
+          </a:p>
+        </p:txBody>
+      </p:sp>
+      <p:sp>
+        <p:nvSpPr>
+          <p:cNvPr id="3" name="Content Placeholder 2">
+            <a:extLst>
+              <a:ext uri="{FF2B5EF4-FFF2-40B4-BE49-F238E27FC236}">
+                <a16:creationId xmlns:a16="http://schemas.microsoft.com/office/drawing/2014/main" id="{2C97151E-05D1-631B-A75C-3B7D2C113C43}"/>
+              </a:ext>
+            </a:extLst>
+          </p:cNvPr>
+          <p:cNvSpPr>
+            <a:spLocks noGrp="1"/>
+          </p:cNvSpPr>
+          <p:nvPr>
+            <p:ph idx="1"/>
+          </p:nvPr>
+        </p:nvSpPr>
+        <p:spPr>
+          <a:xfrm>
+            <a:off x="889000" y="2638044"/>
+            <a:ext cx="9887284" cy="3101983"/>
+          </a:xfrm>
+        </p:spPr>
+        <p:txBody>
+          <a:bodyPr/>
+          <a:lstStyle/>
+          <a:p>
+            <a:r>
+              <a:rPr lang="en-US" dirty="0"/>
+              <a:t>Dataset name: </a:t>
+            </a:r>
+            <a:r>
+              <a:rPr lang="en-US" b="1" i="0" dirty="0">
+                <a:solidFill>
+                  <a:srgbClr val="202124"/>
+                </a:solidFill>
+                <a:effectLst/>
+                <a:latin typeface="zeitung"/>
+              </a:rPr>
+              <a:t>Animal Image Dataset (DOG, CAT and PANDA)*</a:t>
+            </a:r>
+          </a:p>
+          <a:p>
+            <a:r>
+              <a:rPr lang="en-US" dirty="0"/>
+              <a:t>Link to Dataset: </a:t>
+            </a:r>
+          </a:p>
+          <a:p>
+            <a:pPr lvl="1"/>
+            <a:r>
+              <a:rPr lang="en-US" dirty="0">
+                <a:hlinkClick r:id="rId3"/>
+              </a:rPr>
+              <a:t>https://www.kaggle.com/datasets/ashishsaxena2209/animal-image-datasetdog-cat-and-panda</a:t>
+            </a:r>
+            <a:endParaRPr lang="en-US" dirty="0"/>
+          </a:p>
+          <a:p>
+            <a:r>
+              <a:rPr lang="en-US" dirty="0"/>
+              <a:t>3 folder structure:</a:t>
+            </a:r>
+          </a:p>
+          <a:p>
+            <a:pPr lvl="1"/>
+            <a:r>
+              <a:rPr lang="en-US" dirty="0"/>
+              <a:t>Cat</a:t>
+            </a:r>
+          </a:p>
+          <a:p>
+            <a:pPr lvl="1"/>
+            <a:r>
+              <a:rPr lang="en-US" dirty="0"/>
+              <a:t>Dog</a:t>
+            </a:r>
+          </a:p>
+          <a:p>
+            <a:pPr lvl="1"/>
+            <a:r>
+              <a:rPr lang="en-US" dirty="0"/>
+              <a:t>Panda</a:t>
+            </a:r>
+          </a:p>
+        </p:txBody>
+      </p:sp>
+      <p:pic>
+        <p:nvPicPr>
+          <p:cNvPr id="5" name="Picture 4" descr="A screenshot of a computer&#10;&#10;Description automatically generated">
+            <a:extLst>
+              <a:ext uri="{FF2B5EF4-FFF2-40B4-BE49-F238E27FC236}">
+                <a16:creationId xmlns:a16="http://schemas.microsoft.com/office/drawing/2014/main" id="{1827F327-9BEA-335B-151F-1B82BAF05CDF}"/>
+              </a:ext>
+            </a:extLst>
+          </p:cNvPr>
+          <p:cNvPicPr>
+            <a:picLocks noChangeAspect="1"/>
+          </p:cNvPicPr>
+          <p:nvPr/>
+        </p:nvPicPr>
+        <p:blipFill>
+          <a:blip r:embed="rId4"/>
+          <a:stretch>
+            <a:fillRect/>
+          </a:stretch>
+        </p:blipFill>
+        <p:spPr>
+          <a:xfrm>
+            <a:off x="6547184" y="4395537"/>
+            <a:ext cx="5029200" cy="1219200"/>
+          </a:xfrm>
+          <a:prstGeom prst="rect">
+            <a:avLst/>
+          </a:prstGeom>
+        </p:spPr>
+      </p:pic>
+      <p:sp>
+        <p:nvSpPr>
+          <p:cNvPr id="4" name="TextBox 3">
+            <a:extLst>
+              <a:ext uri="{FF2B5EF4-FFF2-40B4-BE49-F238E27FC236}">
+                <a16:creationId xmlns:a16="http://schemas.microsoft.com/office/drawing/2014/main" id="{F48EDE0D-AF94-69D4-064D-7B77077D4002}"/>
+              </a:ext>
+            </a:extLst>
+          </p:cNvPr>
+          <p:cNvSpPr txBox="1"/>
+          <p:nvPr/>
+        </p:nvSpPr>
+        <p:spPr>
+          <a:xfrm>
+            <a:off x="8196034" y="5615521"/>
+            <a:ext cx="1731500" cy="369332"/>
+          </a:xfrm>
+          <a:prstGeom prst="rect">
+            <a:avLst/>
+          </a:prstGeom>
+          <a:noFill/>
+        </p:spPr>
+        <p:txBody>
+          <a:bodyPr wrap="none" rtlCol="0">
+            <a:spAutoFit/>
+          </a:bodyPr>
+          <a:lstStyle/>
+          <a:p>
+            <a:r>
+              <a:rPr lang="en-US" dirty="0"/>
+              <a:t>Folder Structure</a:t>
+            </a:r>
+          </a:p>
+        </p:txBody>
+      </p:sp>
+      <p:sp>
+        <p:nvSpPr>
+          <p:cNvPr id="6" name="TextBox 5">
+            <a:extLst>
+              <a:ext uri="{FF2B5EF4-FFF2-40B4-BE49-F238E27FC236}">
+                <a16:creationId xmlns:a16="http://schemas.microsoft.com/office/drawing/2014/main" id="{10AAB14A-17F3-F77D-748E-575A93FE1228}"/>
+              </a:ext>
+            </a:extLst>
+          </p:cNvPr>
+          <p:cNvSpPr txBox="1"/>
+          <p:nvPr/>
+        </p:nvSpPr>
+        <p:spPr>
+          <a:xfrm>
+            <a:off x="0" y="6488668"/>
+            <a:ext cx="300082" cy="369332"/>
+          </a:xfrm>
+          <a:prstGeom prst="rect">
+            <a:avLst/>
+          </a:prstGeom>
+          <a:noFill/>
+        </p:spPr>
+        <p:txBody>
+          <a:bodyPr wrap="none" rtlCol="0">
+            <a:spAutoFit/>
+          </a:bodyPr>
+          <a:lstStyle/>
+          <a:p>
+            <a:r>
+              <a:rPr lang="en-US" dirty="0"/>
+              <a:t>1</a:t>
+            </a:r>
+          </a:p>
+        </p:txBody>
+      </p:sp>
+    </p:spTree>
+    <p:extLst>
+      <p:ext uri="{BB962C8B-B14F-4D97-AF65-F5344CB8AC3E}">
+        <p14:creationId xmlns:p14="http://schemas.microsoft.com/office/powerpoint/2010/main" val="3646147136"/>
+      </p:ext>
+    </p:extLst>
+  </p:cSld>
+  <p:clrMapOvr>
+    <a:masterClrMapping/>
+  </p:clrMapOvr>
+</p:sld>
+</file>
+
+<file path=ppt/slides/slide5.xml><?xml version="1.0" encoding="utf-8"?>
+<p:sld xmlns:a="http://schemas.openxmlformats.org/drawingml/2006/main" xmlns:r="http://schemas.openxmlformats.org/officeDocument/2006/relationships" xmlns:p="http://schemas.openxmlformats.org/presentationml/2006/main">
+  <p:cSld>
+    <p:spTree>
+      <p:nvGrpSpPr>
+        <p:cNvPr id="1" name=""/>
+        <p:cNvGrpSpPr/>
+        <p:nvPr/>
+      </p:nvGrpSpPr>
+      <p:grpSpPr>
+        <a:xfrm>
+          <a:off x="0" y="0"/>
+          <a:ext cx="0" cy="0"/>
+          <a:chOff x="0" y="0"/>
+          <a:chExt cx="0" cy="0"/>
+        </a:xfrm>
+      </p:grpSpPr>
+      <p:sp>
+        <p:nvSpPr>
+          <p:cNvPr id="2" name="Title 1">
+            <a:extLst>
+              <a:ext uri="{FF2B5EF4-FFF2-40B4-BE49-F238E27FC236}">
                 <a16:creationId xmlns:a16="http://schemas.microsoft.com/office/drawing/2014/main" id="{C24C9551-1BB7-3E29-8F67-20814686C32D}"/>
               </a:ext>
             </a:extLst>
@@ -4863,7 +5229,7 @@
           <a:p>
             <a:r>
               <a:rPr lang="en-US" dirty="0"/>
-              <a:t>Data visualization</a:t>
+              <a:t>Dataset Overview</a:t>
             </a:r>
           </a:p>
         </p:txBody>
@@ -4884,24 +5250,84 @@
             <p:ph idx="1"/>
           </p:nvPr>
         </p:nvSpPr>
-        <p:spPr/>
-        <p:txBody>
-          <a:bodyPr/>
+        <p:spPr>
+          <a:xfrm>
+            <a:off x="762000" y="2999400"/>
+            <a:ext cx="4140200" cy="2081209"/>
+          </a:xfrm>
+        </p:spPr>
+        <p:txBody>
+          <a:bodyPr>
+            <a:normAutofit fontScale="92500" lnSpcReduction="10000"/>
+          </a:bodyPr>
           <a:lstStyle/>
           <a:p>
             <a:r>
               <a:rPr lang="en-US" dirty="0"/>
-              <a:t>Insert sample of each class of images</a:t>
-            </a:r>
+              <a:t>Each animal/directory had 1000 images</a:t>
+            </a:r>
+          </a:p>
+          <a:p>
+            <a:endParaRPr lang="en-US" dirty="0"/>
           </a:p>
           <a:p>
             <a:r>
               <a:rPr lang="en-US" dirty="0"/>
-              <a:t>Size of each class of images</a:t>
-            </a:r>
-          </a:p>
-        </p:txBody>
-      </p:sp>
+              <a:t>Image size was highly varied:</a:t>
+            </a:r>
+          </a:p>
+          <a:p>
+            <a:pPr lvl="1"/>
+            <a:r>
+              <a:rPr lang="en-US" dirty="0"/>
+              <a:t>Smallest images were 55 x 75 pixels</a:t>
+            </a:r>
+          </a:p>
+          <a:p>
+            <a:pPr lvl="1"/>
+            <a:r>
+              <a:rPr lang="en-US" dirty="0"/>
+              <a:t>Largest image was 1600 x 1200 pixels</a:t>
+            </a:r>
+          </a:p>
+          <a:p>
+            <a:pPr lvl="1"/>
+            <a:r>
+              <a:rPr lang="en-US" dirty="0"/>
+              <a:t>Avg image was 431 x 372 pixels</a:t>
+            </a:r>
+          </a:p>
+        </p:txBody>
+      </p:sp>
+      <p:pic>
+        <p:nvPicPr>
+          <p:cNvPr id="5" name="Picture 4">
+            <a:extLst>
+              <a:ext uri="{FF2B5EF4-FFF2-40B4-BE49-F238E27FC236}">
+                <a16:creationId xmlns:a16="http://schemas.microsoft.com/office/drawing/2014/main" id="{BDA9DBDD-EAED-8C8B-3377-781349A33CA5}"/>
+              </a:ext>
+            </a:extLst>
+          </p:cNvPr>
+          <p:cNvPicPr>
+            <a:picLocks noChangeAspect="1"/>
+          </p:cNvPicPr>
+          <p:nvPr/>
+        </p:nvPicPr>
+        <p:blipFill rotWithShape="1">
+          <a:blip r:embed="rId2"/>
+          <a:srcRect t="33321"/>
+          <a:stretch/>
+        </p:blipFill>
+        <p:spPr>
+          <a:xfrm>
+            <a:off x="5269465" y="3099951"/>
+            <a:ext cx="6274835" cy="1880108"/>
+          </a:xfrm>
+          <a:prstGeom prst="rect">
+            <a:avLst/>
+          </a:prstGeom>
+        </p:spPr>
+      </p:pic>
     </p:spTree>
     <p:extLst>
       <p:ext uri="{BB962C8B-B14F-4D97-AF65-F5344CB8AC3E}">
@@ -4915,7 +5341,7 @@
 </p:sld>
 </file>
 
-<file path=ppt/slides/slide5.xml><?xml version="1.0" encoding="utf-8"?>
+<file path=ppt/slides/slide6.xml><?xml version="1.0" encoding="utf-8"?>
 <p:sld xmlns:a="http://schemas.openxmlformats.org/drawingml/2006/main" xmlns:r="http://schemas.openxmlformats.org/officeDocument/2006/relationships" xmlns:p="http://schemas.openxmlformats.org/presentationml/2006/main">
   <p:cSld>
     <p:bg>
@@ -4972,7 +5398,7 @@
           <a:p>
             <a:r>
               <a:rPr lang="en-US" dirty="0"/>
-              <a:t>Dataset Sample</a:t>
+              <a:t>Data Visualization</a:t>
             </a:r>
           </a:p>
         </p:txBody>
@@ -5313,247 +5739,6 @@
     <p:extLst>
       <p:ext uri="{BB962C8B-B14F-4D97-AF65-F5344CB8AC3E}">
         <p14:creationId xmlns:p14="http://schemas.microsoft.com/office/powerpoint/2010/main" val="3738945443"/>
-      </p:ext>
-    </p:extLst>
-  </p:cSld>
-  <p:clrMapOvr>
-    <a:masterClrMapping/>
-  </p:clrMapOvr>
-</p:sld>
-</file>
-
-<file path=ppt/slides/slide6.xml><?xml version="1.0" encoding="utf-8"?>
-<p:sld xmlns:a="http://schemas.openxmlformats.org/drawingml/2006/main" xmlns:r="http://schemas.openxmlformats.org/officeDocument/2006/relationships" xmlns:p="http://schemas.openxmlformats.org/presentationml/2006/main">
-  <p:cSld>
-    <p:spTree>
-      <p:nvGrpSpPr>
-        <p:cNvPr id="1" name=""/>
-        <p:cNvGrpSpPr/>
-        <p:nvPr/>
-      </p:nvGrpSpPr>
-      <p:grpSpPr>
-        <a:xfrm>
-          <a:off x="0" y="0"/>
-          <a:ext cx="0" cy="0"/>
-          <a:chOff x="0" y="0"/>
-          <a:chExt cx="0" cy="0"/>
-        </a:xfrm>
-      </p:grpSpPr>
-      <p:sp>
-        <p:nvSpPr>
-          <p:cNvPr id="2" name="Title 1">
-            <a:extLst>
-              <a:ext uri="{FF2B5EF4-FFF2-40B4-BE49-F238E27FC236}">
-                <a16:creationId xmlns:a16="http://schemas.microsoft.com/office/drawing/2014/main" id="{7DDD3599-1843-AF4C-3558-E20F8751FD50}"/>
-              </a:ext>
-            </a:extLst>
-          </p:cNvPr>
-          <p:cNvSpPr>
-            <a:spLocks noGrp="1"/>
-          </p:cNvSpPr>
-          <p:nvPr>
-            <p:ph type="title"/>
-          </p:nvPr>
-        </p:nvSpPr>
-        <p:spPr/>
-        <p:txBody>
-          <a:bodyPr/>
-          <a:lstStyle/>
-          <a:p>
-            <a:r>
-              <a:rPr lang="en-US" dirty="0"/>
-              <a:t>Dataset</a:t>
-            </a:r>
-          </a:p>
-        </p:txBody>
-      </p:sp>
-      <p:sp>
-        <p:nvSpPr>
-          <p:cNvPr id="3" name="Content Placeholder 2">
-            <a:extLst>
-              <a:ext uri="{FF2B5EF4-FFF2-40B4-BE49-F238E27FC236}">
-                <a16:creationId xmlns:a16="http://schemas.microsoft.com/office/drawing/2014/main" id="{2C97151E-05D1-631B-A75C-3B7D2C113C43}"/>
-              </a:ext>
-            </a:extLst>
-          </p:cNvPr>
-          <p:cNvSpPr>
-            <a:spLocks noGrp="1"/>
-          </p:cNvSpPr>
-          <p:nvPr>
-            <p:ph idx="1"/>
-          </p:nvPr>
-        </p:nvSpPr>
-        <p:spPr>
-          <a:xfrm>
-            <a:off x="1415716" y="2638044"/>
-            <a:ext cx="9360568" cy="3101983"/>
-          </a:xfrm>
-        </p:spPr>
-        <p:txBody>
-          <a:bodyPr/>
-          <a:lstStyle/>
-          <a:p>
-            <a:r>
-              <a:rPr lang="en-US" dirty="0"/>
-              <a:t>Dataset name: </a:t>
-            </a:r>
-            <a:r>
-              <a:rPr lang="en-US" b="1" i="0" dirty="0">
-                <a:solidFill>
-                  <a:srgbClr val="202124"/>
-                </a:solidFill>
-                <a:effectLst/>
-                <a:latin typeface="zeitung"/>
-              </a:rPr>
-              <a:t>Animal Image Dataset (DOG, CAT and PANDA)</a:t>
-            </a:r>
-          </a:p>
-          <a:p>
-            <a:r>
-              <a:rPr lang="en-US" dirty="0"/>
-              <a:t>Link to Dataset: </a:t>
-            </a:r>
-            <a:r>
-              <a:rPr lang="en-US" dirty="0">
-                <a:hlinkClick r:id="rId2"/>
-              </a:rPr>
-              <a:t>https://www.kaggle.com/datasets/ashishsaxena2209/animal-image-datasetdog-cat-and-panda</a:t>
-            </a:r>
-            <a:endParaRPr lang="en-US" dirty="0"/>
-          </a:p>
-          <a:p>
-            <a:r>
-              <a:rPr lang="en-US" dirty="0"/>
-              <a:t>3 folder structure:</a:t>
-            </a:r>
-          </a:p>
-          <a:p>
-            <a:pPr lvl="1"/>
-            <a:r>
-              <a:rPr lang="en-US" dirty="0"/>
-              <a:t>Cat</a:t>
-            </a:r>
-          </a:p>
-          <a:p>
-            <a:pPr lvl="1"/>
-            <a:r>
-              <a:rPr lang="en-US" dirty="0"/>
-              <a:t>Dog</a:t>
-            </a:r>
-          </a:p>
-          <a:p>
-            <a:pPr lvl="1"/>
-            <a:r>
-              <a:rPr lang="en-US" dirty="0"/>
-              <a:t>Panda</a:t>
-            </a:r>
-          </a:p>
-        </p:txBody>
-      </p:sp>
-      <p:pic>
-        <p:nvPicPr>
-          <p:cNvPr id="5" name="Picture 4" descr="A screenshot of a computer&#10;&#10;Description automatically generated">
-            <a:extLst>
-              <a:ext uri="{FF2B5EF4-FFF2-40B4-BE49-F238E27FC236}">
-                <a16:creationId xmlns:a16="http://schemas.microsoft.com/office/drawing/2014/main" id="{1827F327-9BEA-335B-151F-1B82BAF05CDF}"/>
-              </a:ext>
-            </a:extLst>
-          </p:cNvPr>
-          <p:cNvPicPr>
-            <a:picLocks noChangeAspect="1"/>
-          </p:cNvPicPr>
-          <p:nvPr/>
-        </p:nvPicPr>
-        <p:blipFill>
-          <a:blip r:embed="rId3"/>
-          <a:stretch>
-            <a:fillRect/>
-          </a:stretch>
-        </p:blipFill>
-        <p:spPr>
-          <a:xfrm>
-            <a:off x="5747084" y="4395537"/>
-            <a:ext cx="5029200" cy="1219200"/>
-          </a:xfrm>
-          <a:prstGeom prst="rect">
-            <a:avLst/>
-          </a:prstGeom>
-        </p:spPr>
-      </p:pic>
-      <p:sp>
-        <p:nvSpPr>
-          <p:cNvPr id="4" name="TextBox 3">
-            <a:extLst>
-              <a:ext uri="{FF2B5EF4-FFF2-40B4-BE49-F238E27FC236}">
-                <a16:creationId xmlns:a16="http://schemas.microsoft.com/office/drawing/2014/main" id="{F48EDE0D-AF94-69D4-064D-7B77077D4002}"/>
-              </a:ext>
-            </a:extLst>
-          </p:cNvPr>
-          <p:cNvSpPr txBox="1"/>
-          <p:nvPr/>
-        </p:nvSpPr>
-        <p:spPr>
-          <a:xfrm>
-            <a:off x="7395934" y="5615521"/>
-            <a:ext cx="1731500" cy="369332"/>
-          </a:xfrm>
-          <a:prstGeom prst="rect">
-            <a:avLst/>
-          </a:prstGeom>
-          <a:noFill/>
-        </p:spPr>
-        <p:txBody>
-          <a:bodyPr wrap="none" rtlCol="0">
-            <a:spAutoFit/>
-          </a:bodyPr>
-          <a:lstStyle/>
-          <a:p>
-            <a:r>
-              <a:rPr lang="en-US" dirty="0"/>
-              <a:t>Folder Structure</a:t>
-            </a:r>
-          </a:p>
-        </p:txBody>
-      </p:sp>
-      <p:sp>
-        <p:nvSpPr>
-          <p:cNvPr id="6" name="TextBox 5">
-            <a:extLst>
-              <a:ext uri="{FF2B5EF4-FFF2-40B4-BE49-F238E27FC236}">
-                <a16:creationId xmlns:a16="http://schemas.microsoft.com/office/drawing/2014/main" id="{10AAB14A-17F3-F77D-748E-575A93FE1228}"/>
-              </a:ext>
-            </a:extLst>
-          </p:cNvPr>
-          <p:cNvSpPr txBox="1"/>
-          <p:nvPr/>
-        </p:nvSpPr>
-        <p:spPr>
-          <a:xfrm>
-            <a:off x="0" y="6488668"/>
-            <a:ext cx="300082" cy="369332"/>
-          </a:xfrm>
-          <a:prstGeom prst="rect">
-            <a:avLst/>
-          </a:prstGeom>
-          <a:noFill/>
-        </p:spPr>
-        <p:txBody>
-          <a:bodyPr wrap="none" rtlCol="0">
-            <a:spAutoFit/>
-          </a:bodyPr>
-          <a:lstStyle/>
-          <a:p>
-            <a:r>
-              <a:rPr lang="en-US" dirty="0"/>
-              <a:t>1</a:t>
-            </a:r>
-          </a:p>
-        </p:txBody>
-      </p:sp>
-    </p:spTree>
-    <p:extLst>
-      <p:ext uri="{BB962C8B-B14F-4D97-AF65-F5344CB8AC3E}">
-        <p14:creationId xmlns:p14="http://schemas.microsoft.com/office/powerpoint/2010/main" val="3646147136"/>
       </p:ext>
     </p:extLst>
   </p:cSld>

</xml_diff>

<commit_message>
finalized cnn, applied vgg16
</commit_message>
<xml_diff>
--- a/group_proj/presentations/FinalPresentation.pptx
+++ b/group_proj/presentations/FinalPresentation.pptx
@@ -5,7 +5,7 @@
     <p:sldMasterId id="2147483720" r:id="rId1"/>
   </p:sldMasterIdLst>
   <p:notesMasterIdLst>
-    <p:notesMasterId r:id="rId18"/>
+    <p:notesMasterId r:id="rId28"/>
   </p:notesMasterIdLst>
   <p:sldIdLst>
     <p:sldId id="256" r:id="rId2"/>
@@ -21,9 +21,19 @@
     <p:sldId id="274" r:id="rId12"/>
     <p:sldId id="278" r:id="rId13"/>
     <p:sldId id="276" r:id="rId14"/>
-    <p:sldId id="279" r:id="rId15"/>
-    <p:sldId id="277" r:id="rId16"/>
-    <p:sldId id="268" r:id="rId17"/>
+    <p:sldId id="282" r:id="rId15"/>
+    <p:sldId id="283" r:id="rId16"/>
+    <p:sldId id="284" r:id="rId17"/>
+    <p:sldId id="279" r:id="rId18"/>
+    <p:sldId id="281" r:id="rId19"/>
+    <p:sldId id="285" r:id="rId20"/>
+    <p:sldId id="286" r:id="rId21"/>
+    <p:sldId id="289" r:id="rId22"/>
+    <p:sldId id="287" r:id="rId23"/>
+    <p:sldId id="288" r:id="rId24"/>
+    <p:sldId id="290" r:id="rId25"/>
+    <p:sldId id="277" r:id="rId26"/>
+    <p:sldId id="268" r:id="rId27"/>
   </p:sldIdLst>
   <p:sldSz cx="12192000" cy="6858000"/>
   <p:notesSz cx="6858000" cy="9144000"/>
@@ -212,7 +222,7 @@
           <a:p>
             <a:fld id="{B4F796A9-8EC0-5141-B45F-E32396FCD01A}" type="datetimeFigureOut">
               <a:rPr lang="en-US" smtClean="0"/>
-              <a:t>11/18/2023</a:t>
+              <a:t>11/28/23</a:t>
             </a:fld>
             <a:endParaRPr lang="en-US"/>
           </a:p>
@@ -642,7 +652,7 @@
           <a:p>
             <a:fld id="{90053C86-C48F-3743-8746-2CA0384683DA}" type="datetimeFigureOut">
               <a:rPr lang="en-US" smtClean="0"/>
-              <a:t>11/18/2023</a:t>
+              <a:t>11/28/23</a:t>
             </a:fld>
             <a:endParaRPr lang="en-US"/>
           </a:p>
@@ -812,7 +822,7 @@
           <a:p>
             <a:fld id="{90053C86-C48F-3743-8746-2CA0384683DA}" type="datetimeFigureOut">
               <a:rPr lang="en-US" smtClean="0"/>
-              <a:t>11/18/2023</a:t>
+              <a:t>11/28/23</a:t>
             </a:fld>
             <a:endParaRPr lang="en-US"/>
           </a:p>
@@ -992,7 +1002,7 @@
           <a:p>
             <a:fld id="{90053C86-C48F-3743-8746-2CA0384683DA}" type="datetimeFigureOut">
               <a:rPr lang="en-US" smtClean="0"/>
-              <a:t>11/18/2023</a:t>
+              <a:t>11/28/23</a:t>
             </a:fld>
             <a:endParaRPr lang="en-US"/>
           </a:p>
@@ -1162,7 +1172,7 @@
           <a:p>
             <a:fld id="{90053C86-C48F-3743-8746-2CA0384683DA}" type="datetimeFigureOut">
               <a:rPr lang="en-US" smtClean="0"/>
-              <a:t>11/18/2023</a:t>
+              <a:t>11/28/23</a:t>
             </a:fld>
             <a:endParaRPr lang="en-US"/>
           </a:p>
@@ -1430,7 +1440,7 @@
           <a:p>
             <a:fld id="{90053C86-C48F-3743-8746-2CA0384683DA}" type="datetimeFigureOut">
               <a:rPr lang="en-US" smtClean="0"/>
-              <a:t>11/18/2023</a:t>
+              <a:t>11/28/23</a:t>
             </a:fld>
             <a:endParaRPr lang="en-US"/>
           </a:p>
@@ -1662,7 +1672,7 @@
           <a:p>
             <a:fld id="{90053C86-C48F-3743-8746-2CA0384683DA}" type="datetimeFigureOut">
               <a:rPr lang="en-US" smtClean="0"/>
-              <a:t>11/18/2023</a:t>
+              <a:t>11/28/23</a:t>
             </a:fld>
             <a:endParaRPr lang="en-US"/>
           </a:p>
@@ -2021,7 +2031,7 @@
           <a:p>
             <a:fld id="{90053C86-C48F-3743-8746-2CA0384683DA}" type="datetimeFigureOut">
               <a:rPr lang="en-US" smtClean="0"/>
-              <a:t>11/18/2023</a:t>
+              <a:t>11/28/23</a:t>
             </a:fld>
             <a:endParaRPr lang="en-US"/>
           </a:p>
@@ -2162,7 +2172,7 @@
           <a:p>
             <a:fld id="{90053C86-C48F-3743-8746-2CA0384683DA}" type="datetimeFigureOut">
               <a:rPr lang="en-US" smtClean="0"/>
-              <a:t>11/18/2023</a:t>
+              <a:t>11/28/23</a:t>
             </a:fld>
             <a:endParaRPr lang="en-US"/>
           </a:p>
@@ -2257,7 +2267,7 @@
           <a:p>
             <a:fld id="{90053C86-C48F-3743-8746-2CA0384683DA}" type="datetimeFigureOut">
               <a:rPr lang="en-US" smtClean="0"/>
-              <a:t>11/18/2023</a:t>
+              <a:t>11/28/23</a:t>
             </a:fld>
             <a:endParaRPr lang="en-US"/>
           </a:p>
@@ -2614,7 +2624,7 @@
           <a:p>
             <a:fld id="{90053C86-C48F-3743-8746-2CA0384683DA}" type="datetimeFigureOut">
               <a:rPr lang="en-US" smtClean="0"/>
-              <a:t>11/18/2023</a:t>
+              <a:t>11/28/23</a:t>
             </a:fld>
             <a:endParaRPr lang="en-US"/>
           </a:p>
@@ -2971,7 +2981,7 @@
           <a:p>
             <a:fld id="{90053C86-C48F-3743-8746-2CA0384683DA}" type="datetimeFigureOut">
               <a:rPr lang="en-US" smtClean="0"/>
-              <a:t>11/18/2023</a:t>
+              <a:t>11/28/23</a:t>
             </a:fld>
             <a:endParaRPr lang="en-US"/>
           </a:p>
@@ -3213,7 +3223,7 @@
           <a:p>
             <a:fld id="{90053C86-C48F-3743-8746-2CA0384683DA}" type="datetimeFigureOut">
               <a:rPr lang="en-US" smtClean="0"/>
-              <a:t>11/18/2023</a:t>
+              <a:t>11/28/23</a:t>
             </a:fld>
             <a:endParaRPr lang="en-US"/>
           </a:p>
@@ -4180,7 +4190,42 @@
           <a:bodyPr/>
           <a:lstStyle/>
           <a:p>
-            <a:endParaRPr lang="en-US"/>
+            <a:r>
+              <a:rPr lang="en-US" dirty="0"/>
+              <a:t>CNN models apply convolution operations to input data to learn feature and patterns</a:t>
+            </a:r>
+          </a:p>
+          <a:p>
+            <a:pPr lvl="1"/>
+            <a:r>
+              <a:rPr lang="en-US" dirty="0"/>
+              <a:t>Filters and kernels in the convoluted layers capture these features and patterns</a:t>
+            </a:r>
+          </a:p>
+          <a:p>
+            <a:pPr lvl="1"/>
+            <a:r>
+              <a:rPr lang="en-US" dirty="0" err="1"/>
+              <a:t>MaxPooling</a:t>
+            </a:r>
+            <a:r>
+              <a:rPr lang="en-US" dirty="0"/>
+              <a:t> layers retain important features and patterns</a:t>
+            </a:r>
+          </a:p>
+          <a:p>
+            <a:pPr lvl="1"/>
+            <a:r>
+              <a:rPr lang="en-US" dirty="0"/>
+              <a:t>Connected layers combine these features for the model to learn relationships between them</a:t>
+            </a:r>
+          </a:p>
+          <a:p>
+            <a:pPr lvl="1"/>
+            <a:r>
+              <a:rPr lang="en-US" dirty="0"/>
+              <a:t>CNN models are good for image classification because of these methods of capturing and learning features and patterns</a:t>
+            </a:r>
           </a:p>
         </p:txBody>
       </p:sp>
@@ -4219,7 +4264,7 @@
           <p:cNvPr id="2" name="Title 1">
             <a:extLst>
               <a:ext uri="{FF2B5EF4-FFF2-40B4-BE49-F238E27FC236}">
-                <a16:creationId xmlns:a16="http://schemas.microsoft.com/office/drawing/2014/main" id="{61A172E7-5A50-8851-C700-ADDE80C3674F}"/>
+                <a16:creationId xmlns:a16="http://schemas.microsoft.com/office/drawing/2014/main" id="{7F77DDB6-56CB-4EA1-EC0F-B55A735EF8C4}"/>
               </a:ext>
             </a:extLst>
           </p:cNvPr>
@@ -4237,40 +4282,144 @@
           <a:p>
             <a:r>
               <a:rPr lang="en-US" dirty="0"/>
-              <a:t>Model Evaluation - CNN</a:t>
-            </a:r>
-          </a:p>
-        </p:txBody>
-      </p:sp>
-      <p:sp>
-        <p:nvSpPr>
-          <p:cNvPr id="3" name="Content Placeholder 2">
+              <a:t>Machine Learning Model - CNN</a:t>
+            </a:r>
+          </a:p>
+        </p:txBody>
+      </p:sp>
+      <p:pic>
+        <p:nvPicPr>
+          <p:cNvPr id="6" name="Content Placeholder 5" descr="A computer screen with text&#10;&#10;Description automatically generated">
             <a:extLst>
               <a:ext uri="{FF2B5EF4-FFF2-40B4-BE49-F238E27FC236}">
-                <a16:creationId xmlns:a16="http://schemas.microsoft.com/office/drawing/2014/main" id="{31E887B8-1844-DB3B-111D-6329ADBBD78E}"/>
+                <a16:creationId xmlns:a16="http://schemas.microsoft.com/office/drawing/2014/main" id="{EC9E4A4A-48D2-40D0-E160-53B896B93FF1}"/>
               </a:ext>
             </a:extLst>
           </p:cNvPr>
-          <p:cNvSpPr>
-            <a:spLocks noGrp="1"/>
-          </p:cNvSpPr>
+          <p:cNvPicPr>
+            <a:picLocks noGrp="1" noChangeAspect="1"/>
+          </p:cNvPicPr>
           <p:nvPr>
             <p:ph idx="1"/>
           </p:nvPr>
-        </p:nvSpPr>
-        <p:spPr/>
-        <p:txBody>
-          <a:bodyPr/>
-          <a:lstStyle/>
-          <a:p>
-            <a:endParaRPr lang="en-US"/>
+        </p:nvPicPr>
+        <p:blipFill>
+          <a:blip r:embed="rId2"/>
+          <a:stretch>
+            <a:fillRect/>
+          </a:stretch>
+        </p:blipFill>
+        <p:spPr>
+          <a:xfrm>
+            <a:off x="128954" y="3429000"/>
+            <a:ext cx="5002191" cy="3101975"/>
+          </a:xfrm>
+        </p:spPr>
+      </p:pic>
+      <p:pic>
+        <p:nvPicPr>
+          <p:cNvPr id="8" name="Picture 7" descr="A screen shot of a computer code&#10;&#10;Description automatically generated">
+            <a:extLst>
+              <a:ext uri="{FF2B5EF4-FFF2-40B4-BE49-F238E27FC236}">
+                <a16:creationId xmlns:a16="http://schemas.microsoft.com/office/drawing/2014/main" id="{D5318472-DE28-6D2C-0CF0-BCC9395537F9}"/>
+              </a:ext>
+            </a:extLst>
+          </p:cNvPr>
+          <p:cNvPicPr>
+            <a:picLocks noChangeAspect="1"/>
+          </p:cNvPicPr>
+          <p:nvPr/>
+        </p:nvPicPr>
+        <p:blipFill>
+          <a:blip r:embed="rId3"/>
+          <a:stretch>
+            <a:fillRect/>
+          </a:stretch>
+        </p:blipFill>
+        <p:spPr>
+          <a:xfrm>
+            <a:off x="5319932" y="2653350"/>
+            <a:ext cx="6248400" cy="2274953"/>
+          </a:xfrm>
+          <a:prstGeom prst="rect">
+            <a:avLst/>
+          </a:prstGeom>
+        </p:spPr>
+      </p:pic>
+      <p:sp>
+        <p:nvSpPr>
+          <p:cNvPr id="11" name="TextBox 10">
+            <a:extLst>
+              <a:ext uri="{FF2B5EF4-FFF2-40B4-BE49-F238E27FC236}">
+                <a16:creationId xmlns:a16="http://schemas.microsoft.com/office/drawing/2014/main" id="{61022E28-DF53-7A37-BABC-D1C5F2AD2CEF}"/>
+              </a:ext>
+            </a:extLst>
+          </p:cNvPr>
+          <p:cNvSpPr txBox="1"/>
+          <p:nvPr/>
+        </p:nvSpPr>
+        <p:spPr>
+          <a:xfrm>
+            <a:off x="94393" y="2562468"/>
+            <a:ext cx="5131145" cy="646331"/>
+          </a:xfrm>
+          <a:prstGeom prst="rect">
+            <a:avLst/>
+          </a:prstGeom>
+          <a:noFill/>
+        </p:spPr>
+        <p:txBody>
+          <a:bodyPr wrap="square" rtlCol="0">
+            <a:spAutoFit/>
+          </a:bodyPr>
+          <a:lstStyle/>
+          <a:p>
+            <a:r>
+              <a:rPr lang="en-US" dirty="0"/>
+              <a:t>Before applying the CNN model, we must reshape the images to fit the expected formats</a:t>
+            </a:r>
+          </a:p>
+        </p:txBody>
+      </p:sp>
+      <p:sp>
+        <p:nvSpPr>
+          <p:cNvPr id="12" name="TextBox 11">
+            <a:extLst>
+              <a:ext uri="{FF2B5EF4-FFF2-40B4-BE49-F238E27FC236}">
+                <a16:creationId xmlns:a16="http://schemas.microsoft.com/office/drawing/2014/main" id="{632116F2-9385-5308-3047-B14420BF0063}"/>
+              </a:ext>
+            </a:extLst>
+          </p:cNvPr>
+          <p:cNvSpPr txBox="1"/>
+          <p:nvPr/>
+        </p:nvSpPr>
+        <p:spPr>
+          <a:xfrm>
+            <a:off x="5319932" y="5246977"/>
+            <a:ext cx="5662245" cy="646331"/>
+          </a:xfrm>
+          <a:prstGeom prst="rect">
+            <a:avLst/>
+          </a:prstGeom>
+          <a:noFill/>
+        </p:spPr>
+        <p:txBody>
+          <a:bodyPr wrap="square" rtlCol="0">
+            <a:spAutoFit/>
+          </a:bodyPr>
+          <a:lstStyle/>
+          <a:p>
+            <a:r>
+              <a:rPr lang="en-US" dirty="0"/>
+              <a:t>Apply data augmentation to the data set to increase variance within the data</a:t>
+            </a:r>
           </a:p>
         </p:txBody>
       </p:sp>
     </p:spTree>
     <p:extLst>
       <p:ext uri="{BB962C8B-B14F-4D97-AF65-F5344CB8AC3E}">
-        <p14:creationId xmlns:p14="http://schemas.microsoft.com/office/powerpoint/2010/main" val="3449298076"/>
+        <p14:creationId xmlns:p14="http://schemas.microsoft.com/office/powerpoint/2010/main" val="3868292714"/>
       </p:ext>
     </p:extLst>
   </p:cSld>
@@ -4302,7 +4451,7 @@
           <p:cNvPr id="2" name="Title 1">
             <a:extLst>
               <a:ext uri="{FF2B5EF4-FFF2-40B4-BE49-F238E27FC236}">
-                <a16:creationId xmlns:a16="http://schemas.microsoft.com/office/drawing/2014/main" id="{40B4BF6D-6144-2878-CAA9-AC1A6E32EC1D}"/>
+                <a16:creationId xmlns:a16="http://schemas.microsoft.com/office/drawing/2014/main" id="{7F77DDB6-56CB-4EA1-EC0F-B55A735EF8C4}"/>
               </a:ext>
             </a:extLst>
           </p:cNvPr>
@@ -4319,41 +4468,174 @@
           <a:lstStyle/>
           <a:p>
             <a:r>
-              <a:rPr lang="en-US" dirty="0"/>
-              <a:t>Conclusion</a:t>
-            </a:r>
-          </a:p>
-        </p:txBody>
-      </p:sp>
-      <p:sp>
-        <p:nvSpPr>
-          <p:cNvPr id="3" name="Content Placeholder 2">
+              <a:rPr lang="en-US"/>
+              <a:t>Machine Learning Model - CNN</a:t>
+            </a:r>
+            <a:endParaRPr lang="en-US" dirty="0"/>
+          </a:p>
+        </p:txBody>
+      </p:sp>
+      <p:sp>
+        <p:nvSpPr>
+          <p:cNvPr id="17" name="TextBox 16">
             <a:extLst>
               <a:ext uri="{FF2B5EF4-FFF2-40B4-BE49-F238E27FC236}">
-                <a16:creationId xmlns:a16="http://schemas.microsoft.com/office/drawing/2014/main" id="{6E42F117-53C3-B813-2AC6-FCB6ECC51B60}"/>
+                <a16:creationId xmlns:a16="http://schemas.microsoft.com/office/drawing/2014/main" id="{BFB04C3E-6B77-3D18-A049-BF3B80B575E8}"/>
               </a:ext>
             </a:extLst>
           </p:cNvPr>
-          <p:cNvSpPr>
-            <a:spLocks noGrp="1"/>
-          </p:cNvSpPr>
+          <p:cNvSpPr txBox="1"/>
+          <p:nvPr/>
+        </p:nvSpPr>
+        <p:spPr>
+          <a:xfrm>
+            <a:off x="5521570" y="2505670"/>
+            <a:ext cx="6377353" cy="4247317"/>
+          </a:xfrm>
+          <a:prstGeom prst="rect">
+            <a:avLst/>
+          </a:prstGeom>
+          <a:noFill/>
+        </p:spPr>
+        <p:txBody>
+          <a:bodyPr wrap="square" rtlCol="0">
+            <a:spAutoFit/>
+          </a:bodyPr>
+          <a:lstStyle/>
+          <a:p>
+            <a:pPr marL="285750" indent="-285750">
+              <a:buFont typeface="Arial" panose="020B0604020202020204" pitchFamily="34" charset="0"/>
+              <a:buChar char="•"/>
+            </a:pPr>
+            <a:r>
+              <a:rPr lang="en-US" dirty="0"/>
+              <a:t>Input layer is a Conv2D layer with 16 filters of size 3x3</a:t>
+            </a:r>
+          </a:p>
+          <a:p>
+            <a:pPr marL="285750" indent="-285750">
+              <a:buFont typeface="Arial" panose="020B0604020202020204" pitchFamily="34" charset="0"/>
+              <a:buChar char="•"/>
+            </a:pPr>
+            <a:r>
+              <a:rPr lang="en-US" dirty="0"/>
+              <a:t>Next layer is a </a:t>
+            </a:r>
+            <a:r>
+              <a:rPr lang="en-US" dirty="0" err="1"/>
+              <a:t>MaxPooling</a:t>
+            </a:r>
+            <a:r>
+              <a:rPr lang="en-US" dirty="0"/>
+              <a:t> layer with window size 2x2</a:t>
+            </a:r>
+          </a:p>
+          <a:p>
+            <a:pPr marL="742950" lvl="1" indent="-285750">
+              <a:buFont typeface="Arial" panose="020B0604020202020204" pitchFamily="34" charset="0"/>
+              <a:buChar char="•"/>
+            </a:pPr>
+            <a:r>
+              <a:rPr lang="en-US" dirty="0" err="1"/>
+              <a:t>MaxPooling</a:t>
+            </a:r>
+            <a:r>
+              <a:rPr lang="en-US" dirty="0"/>
+              <a:t> retains the max value within the 2x2 window, and discards the rest</a:t>
+            </a:r>
+          </a:p>
+          <a:p>
+            <a:pPr marL="742950" lvl="1" indent="-285750">
+              <a:buFont typeface="Arial" panose="020B0604020202020204" pitchFamily="34" charset="0"/>
+              <a:buChar char="•"/>
+            </a:pPr>
+            <a:r>
+              <a:rPr lang="en-US" dirty="0"/>
+              <a:t>Retaining important features and discarding the rest makes the model more computationally efficient</a:t>
+            </a:r>
+          </a:p>
+          <a:p>
+            <a:pPr marL="285750" indent="-285750">
+              <a:buFont typeface="Arial" panose="020B0604020202020204" pitchFamily="34" charset="0"/>
+              <a:buChar char="•"/>
+            </a:pPr>
+            <a:r>
+              <a:rPr lang="en-US" dirty="0"/>
+              <a:t>Dropout layers are used to help prevent overfitting by randomly dropping neurons during training</a:t>
+            </a:r>
+          </a:p>
+          <a:p>
+            <a:pPr marL="285750" indent="-285750">
+              <a:buFont typeface="Arial" panose="020B0604020202020204" pitchFamily="34" charset="0"/>
+              <a:buChar char="•"/>
+            </a:pPr>
+            <a:r>
+              <a:rPr lang="en-US" dirty="0"/>
+              <a:t>We flatten the output from the previous convoluted layer into a one dimensional vector before moving onto the fully connected layer</a:t>
+            </a:r>
+          </a:p>
+          <a:p>
+            <a:pPr marL="285750" indent="-285750">
+              <a:buFont typeface="Arial" panose="020B0604020202020204" pitchFamily="34" charset="0"/>
+              <a:buChar char="•"/>
+            </a:pPr>
+            <a:r>
+              <a:rPr lang="en-US" dirty="0"/>
+              <a:t>Dense adds a fully connected layer</a:t>
+            </a:r>
+          </a:p>
+          <a:p>
+            <a:pPr marL="285750" indent="-285750">
+              <a:buFont typeface="Arial" panose="020B0604020202020204" pitchFamily="34" charset="0"/>
+              <a:buChar char="•"/>
+            </a:pPr>
+            <a:r>
+              <a:rPr lang="en-US" dirty="0"/>
+              <a:t>Output layer is a fully connected layer with 3 neurons (one for each class)</a:t>
+            </a:r>
+          </a:p>
+          <a:p>
+            <a:pPr marL="285750" indent="-285750">
+              <a:buFont typeface="Arial" panose="020B0604020202020204" pitchFamily="34" charset="0"/>
+              <a:buChar char="•"/>
+            </a:pPr>
+            <a:endParaRPr lang="en-US" dirty="0"/>
+          </a:p>
+        </p:txBody>
+      </p:sp>
+      <p:pic>
+        <p:nvPicPr>
+          <p:cNvPr id="21" name="Content Placeholder 20" descr="A screen shot of a computer program&#10;&#10;Description automatically generated">
+            <a:extLst>
+              <a:ext uri="{FF2B5EF4-FFF2-40B4-BE49-F238E27FC236}">
+                <a16:creationId xmlns:a16="http://schemas.microsoft.com/office/drawing/2014/main" id="{A69BB044-5428-EF06-FA7E-8B8F75421632}"/>
+              </a:ext>
+            </a:extLst>
+          </p:cNvPr>
+          <p:cNvPicPr>
+            <a:picLocks noGrp="1" noChangeAspect="1"/>
+          </p:cNvPicPr>
           <p:nvPr>
             <p:ph idx="1"/>
           </p:nvPr>
-        </p:nvSpPr>
-        <p:spPr/>
-        <p:txBody>
-          <a:bodyPr/>
-          <a:lstStyle/>
-          <a:p>
-            <a:endParaRPr lang="en-US"/>
-          </a:p>
-        </p:txBody>
-      </p:sp>
+        </p:nvPicPr>
+        <p:blipFill>
+          <a:blip r:embed="rId2"/>
+          <a:stretch>
+            <a:fillRect/>
+          </a:stretch>
+        </p:blipFill>
+        <p:spPr>
+          <a:xfrm>
+            <a:off x="723563" y="2505670"/>
+            <a:ext cx="4575267" cy="4001339"/>
+          </a:xfrm>
+        </p:spPr>
+      </p:pic>
     </p:spTree>
     <p:extLst>
       <p:ext uri="{BB962C8B-B14F-4D97-AF65-F5344CB8AC3E}">
-        <p14:creationId xmlns:p14="http://schemas.microsoft.com/office/powerpoint/2010/main" val="2639777028"/>
+        <p14:creationId xmlns:p14="http://schemas.microsoft.com/office/powerpoint/2010/main" val="2522544767"/>
       </p:ext>
     </p:extLst>
   </p:cSld>
@@ -4382,170 +4664,653 @@
       </p:grpSpPr>
       <p:sp>
         <p:nvSpPr>
-          <p:cNvPr id="7" name="Title 1">
+          <p:cNvPr id="2" name="Title 1">
             <a:extLst>
               <a:ext uri="{FF2B5EF4-FFF2-40B4-BE49-F238E27FC236}">
-                <a16:creationId xmlns:a16="http://schemas.microsoft.com/office/drawing/2014/main" id="{2958DF31-9AD7-6A84-2795-8AA3925283AB}"/>
+                <a16:creationId xmlns:a16="http://schemas.microsoft.com/office/drawing/2014/main" id="{7F77DDB6-56CB-4EA1-EC0F-B55A735EF8C4}"/>
               </a:ext>
             </a:extLst>
           </p:cNvPr>
-          <p:cNvSpPr txBox="1">
-            <a:spLocks/>
-          </p:cNvSpPr>
+          <p:cNvSpPr>
+            <a:spLocks noGrp="1"/>
+          </p:cNvSpPr>
+          <p:nvPr>
+            <p:ph type="title"/>
+          </p:nvPr>
+        </p:nvSpPr>
+        <p:spPr/>
+        <p:txBody>
+          <a:bodyPr/>
+          <a:lstStyle/>
+          <a:p>
+            <a:r>
+              <a:rPr lang="en-US" dirty="0"/>
+              <a:t>Machine Learning Model - CNN</a:t>
+            </a:r>
+          </a:p>
+        </p:txBody>
+      </p:sp>
+      <p:pic>
+        <p:nvPicPr>
+          <p:cNvPr id="5" name="Content Placeholder 4" descr="A screen shot of a computer program&#10;&#10;Description automatically generated">
+            <a:extLst>
+              <a:ext uri="{FF2B5EF4-FFF2-40B4-BE49-F238E27FC236}">
+                <a16:creationId xmlns:a16="http://schemas.microsoft.com/office/drawing/2014/main" id="{8EAF4AD6-E94A-6188-B1AF-690136CBA479}"/>
+              </a:ext>
+            </a:extLst>
+          </p:cNvPr>
+          <p:cNvPicPr>
+            <a:picLocks noGrp="1" noChangeAspect="1"/>
+          </p:cNvPicPr>
+          <p:nvPr>
+            <p:ph idx="1"/>
+          </p:nvPr>
+        </p:nvPicPr>
+        <p:blipFill>
+          <a:blip r:embed="rId2"/>
+          <a:stretch>
+            <a:fillRect/>
+          </a:stretch>
+        </p:blipFill>
+        <p:spPr>
+          <a:xfrm>
+            <a:off x="1132500" y="3841080"/>
+            <a:ext cx="9927000" cy="1649703"/>
+          </a:xfrm>
+        </p:spPr>
+      </p:pic>
+      <p:pic>
+        <p:nvPicPr>
+          <p:cNvPr id="7" name="Picture 6">
+            <a:extLst>
+              <a:ext uri="{FF2B5EF4-FFF2-40B4-BE49-F238E27FC236}">
+                <a16:creationId xmlns:a16="http://schemas.microsoft.com/office/drawing/2014/main" id="{777DBC1E-A25C-6F99-978D-B19E6BDB79AE}"/>
+              </a:ext>
+            </a:extLst>
+          </p:cNvPr>
+          <p:cNvPicPr>
+            <a:picLocks noChangeAspect="1"/>
+          </p:cNvPicPr>
           <p:nvPr/>
-        </p:nvSpPr>
-        <p:spPr bwMode="blackWhite">
+        </p:nvPicPr>
+        <p:blipFill>
+          <a:blip r:embed="rId3"/>
+          <a:stretch>
+            <a:fillRect/>
+          </a:stretch>
+        </p:blipFill>
+        <p:spPr>
           <a:xfrm>
-            <a:off x="690813" y="1058779"/>
-            <a:ext cx="10810373" cy="4308656"/>
+            <a:off x="1480162" y="2490028"/>
+            <a:ext cx="9060023" cy="526893"/>
           </a:xfrm>
           <a:prstGeom prst="rect">
             <a:avLst/>
           </a:prstGeom>
-          <a:solidFill>
-            <a:srgbClr val="FFFFFF">
-              <a:alpha val="10000"/>
-            </a:srgbClr>
-          </a:solidFill>
-          <a:ln w="38100" cap="sq">
-            <a:solidFill>
-              <a:srgbClr val="FFFFFF">
-                <a:alpha val="10000"/>
-              </a:srgbClr>
-            </a:solidFill>
-            <a:miter lim="800000"/>
-          </a:ln>
         </p:spPr>
-        <p:txBody>
-          <a:bodyPr vert="horz" lIns="274320" tIns="182880" rIns="274320" bIns="182880" rtlCol="0" anchor="ctr" anchorCtr="1">
-            <a:normAutofit/>
-          </a:bodyPr>
-          <a:lstStyle>
-            <a:lvl1pPr algn="ctr" defTabSz="914400" rtl="0" eaLnBrk="1" latinLnBrk="0" hangingPunct="1">
-              <a:lnSpc>
-                <a:spcPct val="90000"/>
-              </a:lnSpc>
-              <a:spcBef>
-                <a:spcPct val="0"/>
-              </a:spcBef>
-              <a:buNone/>
-              <a:defRPr sz="3800" kern="1200" cap="all" spc="200" baseline="0">
-                <a:solidFill>
-                  <a:srgbClr val="262626"/>
-                </a:solidFill>
-                <a:latin typeface="+mj-lt"/>
-                <a:ea typeface="+mj-ea"/>
-                <a:cs typeface="+mj-cs"/>
-              </a:defRPr>
-            </a:lvl1pPr>
-          </a:lstStyle>
-          <a:p>
-            <a:endParaRPr lang="en-US" dirty="0"/>
-          </a:p>
-        </p:txBody>
-      </p:sp>
-      <p:sp>
-        <p:nvSpPr>
-          <p:cNvPr id="2" name="Title 1">
+      </p:pic>
+      <p:sp>
+        <p:nvSpPr>
+          <p:cNvPr id="8" name="TextBox 7">
             <a:extLst>
               <a:ext uri="{FF2B5EF4-FFF2-40B4-BE49-F238E27FC236}">
-                <a16:creationId xmlns:a16="http://schemas.microsoft.com/office/drawing/2014/main" id="{AF755AED-A382-72F6-C59E-B4E1FC1F9AF7}"/>
+                <a16:creationId xmlns:a16="http://schemas.microsoft.com/office/drawing/2014/main" id="{A23E9C19-29A1-0CAF-10F9-FC6E0E45AE83}"/>
               </a:ext>
             </a:extLst>
           </p:cNvPr>
-          <p:cNvSpPr>
-            <a:spLocks noGrp="1"/>
-          </p:cNvSpPr>
-          <p:nvPr>
-            <p:ph type="ctrTitle"/>
-          </p:nvPr>
+          <p:cNvSpPr txBox="1"/>
+          <p:nvPr/>
         </p:nvSpPr>
         <p:spPr>
-          <a:ln w="76200">
-            <a:solidFill>
-              <a:srgbClr val="272727"/>
-            </a:solidFill>
-          </a:ln>
-        </p:spPr>
-        <p:txBody>
-          <a:bodyPr/>
-          <a:lstStyle/>
-          <a:p>
-            <a:r>
-              <a:rPr lang="en-US" dirty="0"/>
-              <a:t>Thank You</a:t>
-            </a:r>
-          </a:p>
-        </p:txBody>
-      </p:sp>
-      <p:sp>
-        <p:nvSpPr>
-          <p:cNvPr id="8" name="Title 1">
-            <a:extLst>
-              <a:ext uri="{FF2B5EF4-FFF2-40B4-BE49-F238E27FC236}">
-                <a16:creationId xmlns:a16="http://schemas.microsoft.com/office/drawing/2014/main" id="{869F5907-3DE9-96AA-5726-6D064EAF0140}"/>
-              </a:ext>
-            </a:extLst>
-          </p:cNvPr>
-          <p:cNvSpPr txBox="1">
-            <a:spLocks/>
-          </p:cNvSpPr>
-          <p:nvPr/>
-        </p:nvSpPr>
-        <p:spPr bwMode="blackWhite">
           <a:xfrm>
-            <a:off x="1227221" y="2054125"/>
-            <a:ext cx="9781674" cy="2311158"/>
+            <a:off x="1480162" y="3244334"/>
+            <a:ext cx="6030818" cy="369332"/>
           </a:xfrm>
           <a:prstGeom prst="rect">
             <a:avLst/>
           </a:prstGeom>
-          <a:solidFill>
-            <a:srgbClr val="FFFFFF">
-              <a:alpha val="10000"/>
-            </a:srgbClr>
-          </a:solidFill>
-          <a:ln w="38100" cap="sq">
-            <a:solidFill>
-              <a:srgbClr val="FFFFFF">
-                <a:alpha val="10000"/>
-              </a:srgbClr>
-            </a:solidFill>
-            <a:miter lim="800000"/>
-          </a:ln>
+          <a:noFill/>
         </p:spPr>
         <p:txBody>
-          <a:bodyPr vert="horz" lIns="274320" tIns="182880" rIns="274320" bIns="182880" rtlCol="0" anchor="ctr" anchorCtr="1">
-            <a:normAutofit/>
+          <a:bodyPr wrap="none" rtlCol="0">
+            <a:spAutoFit/>
           </a:bodyPr>
-          <a:lstStyle>
-            <a:lvl1pPr algn="ctr" defTabSz="914400" rtl="0" eaLnBrk="1" latinLnBrk="0" hangingPunct="1">
-              <a:lnSpc>
-                <a:spcPct val="90000"/>
-              </a:lnSpc>
-              <a:spcBef>
-                <a:spcPct val="0"/>
-              </a:spcBef>
-              <a:buNone/>
-              <a:defRPr sz="3800" kern="1200" cap="all" spc="200" baseline="0">
-                <a:solidFill>
-                  <a:srgbClr val="262626"/>
-                </a:solidFill>
-                <a:latin typeface="+mj-lt"/>
-                <a:ea typeface="+mj-ea"/>
-                <a:cs typeface="+mj-cs"/>
-              </a:defRPr>
-            </a:lvl1pPr>
-          </a:lstStyle>
-          <a:p>
-            <a:endParaRPr lang="en-US" dirty="0"/>
+          <a:lstStyle/>
+          <a:p>
+            <a:r>
+              <a:rPr lang="en-US" dirty="0"/>
+              <a:t>Train generator is used to generate augmented batches of data</a:t>
+            </a:r>
+          </a:p>
+        </p:txBody>
+      </p:sp>
+      <p:sp>
+        <p:nvSpPr>
+          <p:cNvPr id="9" name="TextBox 8">
+            <a:extLst>
+              <a:ext uri="{FF2B5EF4-FFF2-40B4-BE49-F238E27FC236}">
+                <a16:creationId xmlns:a16="http://schemas.microsoft.com/office/drawing/2014/main" id="{0E74EC0C-D16F-C94E-F5C3-79E346696B21}"/>
+              </a:ext>
+            </a:extLst>
+          </p:cNvPr>
+          <p:cNvSpPr txBox="1"/>
+          <p:nvPr/>
+        </p:nvSpPr>
+        <p:spPr>
+          <a:xfrm>
+            <a:off x="1132500" y="5718197"/>
+            <a:ext cx="10091865" cy="369332"/>
+          </a:xfrm>
+          <a:prstGeom prst="rect">
+            <a:avLst/>
+          </a:prstGeom>
+          <a:noFill/>
+        </p:spPr>
+        <p:txBody>
+          <a:bodyPr wrap="none" rtlCol="0">
+            <a:spAutoFit/>
+          </a:bodyPr>
+          <a:lstStyle/>
+          <a:p>
+            <a:r>
+              <a:rPr lang="en-US" dirty="0"/>
+              <a:t>Fit the model and implement early stopping with a significant epoch size to prevent underfitting/overfitting</a:t>
+            </a:r>
           </a:p>
         </p:txBody>
       </p:sp>
     </p:spTree>
     <p:extLst>
       <p:ext uri="{BB962C8B-B14F-4D97-AF65-F5344CB8AC3E}">
-        <p14:creationId xmlns:p14="http://schemas.microsoft.com/office/powerpoint/2010/main" val="2719211162"/>
+        <p14:creationId xmlns:p14="http://schemas.microsoft.com/office/powerpoint/2010/main" val="974409885"/>
+      </p:ext>
+    </p:extLst>
+  </p:cSld>
+  <p:clrMapOvr>
+    <a:masterClrMapping/>
+  </p:clrMapOvr>
+</p:sld>
+</file>
+
+<file path=ppt/slides/slide17.xml><?xml version="1.0" encoding="utf-8"?>
+<p:sld xmlns:a="http://schemas.openxmlformats.org/drawingml/2006/main" xmlns:r="http://schemas.openxmlformats.org/officeDocument/2006/relationships" xmlns:p="http://schemas.openxmlformats.org/presentationml/2006/main">
+  <p:cSld>
+    <p:spTree>
+      <p:nvGrpSpPr>
+        <p:cNvPr id="1" name=""/>
+        <p:cNvGrpSpPr/>
+        <p:nvPr/>
+      </p:nvGrpSpPr>
+      <p:grpSpPr>
+        <a:xfrm>
+          <a:off x="0" y="0"/>
+          <a:ext cx="0" cy="0"/>
+          <a:chOff x="0" y="0"/>
+          <a:chExt cx="0" cy="0"/>
+        </a:xfrm>
+      </p:grpSpPr>
+      <p:sp>
+        <p:nvSpPr>
+          <p:cNvPr id="2" name="Title 1">
+            <a:extLst>
+              <a:ext uri="{FF2B5EF4-FFF2-40B4-BE49-F238E27FC236}">
+                <a16:creationId xmlns:a16="http://schemas.microsoft.com/office/drawing/2014/main" id="{61A172E7-5A50-8851-C700-ADDE80C3674F}"/>
+              </a:ext>
+            </a:extLst>
+          </p:cNvPr>
+          <p:cNvSpPr>
+            <a:spLocks noGrp="1"/>
+          </p:cNvSpPr>
+          <p:nvPr>
+            <p:ph type="title"/>
+          </p:nvPr>
+        </p:nvSpPr>
+        <p:spPr/>
+        <p:txBody>
+          <a:bodyPr/>
+          <a:lstStyle/>
+          <a:p>
+            <a:r>
+              <a:rPr lang="en-US" dirty="0"/>
+              <a:t>Model Evaluation - CNN</a:t>
+            </a:r>
+          </a:p>
+        </p:txBody>
+      </p:sp>
+      <p:pic>
+        <p:nvPicPr>
+          <p:cNvPr id="5" name="Content Placeholder 4" descr="A black background with white text&#10;&#10;Description automatically generated">
+            <a:extLst>
+              <a:ext uri="{FF2B5EF4-FFF2-40B4-BE49-F238E27FC236}">
+                <a16:creationId xmlns:a16="http://schemas.microsoft.com/office/drawing/2014/main" id="{41861CDB-393E-E5AF-9950-4F01A82A098F}"/>
+              </a:ext>
+            </a:extLst>
+          </p:cNvPr>
+          <p:cNvPicPr>
+            <a:picLocks noGrp="1" noChangeAspect="1"/>
+          </p:cNvPicPr>
+          <p:nvPr>
+            <p:ph idx="1"/>
+          </p:nvPr>
+        </p:nvPicPr>
+        <p:blipFill>
+          <a:blip r:embed="rId2"/>
+          <a:stretch>
+            <a:fillRect/>
+          </a:stretch>
+        </p:blipFill>
+        <p:spPr>
+          <a:xfrm>
+            <a:off x="5661994" y="2497933"/>
+            <a:ext cx="5773901" cy="1656080"/>
+          </a:xfrm>
+        </p:spPr>
+      </p:pic>
+      <p:sp>
+        <p:nvSpPr>
+          <p:cNvPr id="6" name="TextBox 5">
+            <a:extLst>
+              <a:ext uri="{FF2B5EF4-FFF2-40B4-BE49-F238E27FC236}">
+                <a16:creationId xmlns:a16="http://schemas.microsoft.com/office/drawing/2014/main" id="{4EFD123D-64A1-ADBF-F95C-7B695F8F7F72}"/>
+              </a:ext>
+            </a:extLst>
+          </p:cNvPr>
+          <p:cNvSpPr txBox="1"/>
+          <p:nvPr/>
+        </p:nvSpPr>
+        <p:spPr>
+          <a:xfrm>
+            <a:off x="5661995" y="4361204"/>
+            <a:ext cx="5896960" cy="1477328"/>
+          </a:xfrm>
+          <a:prstGeom prst="rect">
+            <a:avLst/>
+          </a:prstGeom>
+          <a:noFill/>
+        </p:spPr>
+        <p:txBody>
+          <a:bodyPr wrap="square" rtlCol="0">
+            <a:spAutoFit/>
+          </a:bodyPr>
+          <a:lstStyle/>
+          <a:p>
+            <a:pPr marL="285750" indent="-285750">
+              <a:buFont typeface="Arial" panose="020B0604020202020204" pitchFamily="34" charset="0"/>
+              <a:buChar char="•"/>
+            </a:pPr>
+            <a:r>
+              <a:rPr lang="en-US" dirty="0"/>
+              <a:t>Most runs would reach between 60-70% accuracy</a:t>
+            </a:r>
+          </a:p>
+          <a:p>
+            <a:pPr marL="742950" lvl="1" indent="-285750">
+              <a:buFont typeface="Arial" panose="020B0604020202020204" pitchFamily="34" charset="0"/>
+              <a:buChar char="•"/>
+            </a:pPr>
+            <a:r>
+              <a:rPr lang="en-US" dirty="0"/>
+              <a:t>Applying data augmentation seemed to be what increased performance the most</a:t>
+            </a:r>
+          </a:p>
+          <a:p>
+            <a:pPr marL="742950" lvl="1" indent="-285750">
+              <a:buFont typeface="Arial" panose="020B0604020202020204" pitchFamily="34" charset="0"/>
+              <a:buChar char="•"/>
+            </a:pPr>
+            <a:r>
+              <a:rPr lang="en-US" dirty="0"/>
+              <a:t>Model consistently had the most difficulty classifying dogs and the most success classifying pandas</a:t>
+            </a:r>
+          </a:p>
+        </p:txBody>
+      </p:sp>
+      <p:pic>
+        <p:nvPicPr>
+          <p:cNvPr id="7" name="Picture 6">
+            <a:extLst>
+              <a:ext uri="{FF2B5EF4-FFF2-40B4-BE49-F238E27FC236}">
+                <a16:creationId xmlns:a16="http://schemas.microsoft.com/office/drawing/2014/main" id="{9A1D6BF3-B119-F3A3-C110-617F5CF22BFD}"/>
+              </a:ext>
+            </a:extLst>
+          </p:cNvPr>
+          <p:cNvPicPr>
+            <a:picLocks noChangeAspect="1"/>
+          </p:cNvPicPr>
+          <p:nvPr/>
+        </p:nvPicPr>
+        <p:blipFill>
+          <a:blip r:embed="rId3"/>
+          <a:stretch>
+            <a:fillRect/>
+          </a:stretch>
+        </p:blipFill>
+        <p:spPr>
+          <a:xfrm>
+            <a:off x="791308" y="2497933"/>
+            <a:ext cx="4422710" cy="3726543"/>
+          </a:xfrm>
+          <a:prstGeom prst="rect">
+            <a:avLst/>
+          </a:prstGeom>
+        </p:spPr>
+      </p:pic>
+    </p:spTree>
+    <p:extLst>
+      <p:ext uri="{BB962C8B-B14F-4D97-AF65-F5344CB8AC3E}">
+        <p14:creationId xmlns:p14="http://schemas.microsoft.com/office/powerpoint/2010/main" val="3449298076"/>
+      </p:ext>
+    </p:extLst>
+  </p:cSld>
+  <p:clrMapOvr>
+    <a:masterClrMapping/>
+  </p:clrMapOvr>
+</p:sld>
+</file>
+
+<file path=ppt/slides/slide18.xml><?xml version="1.0" encoding="utf-8"?>
+<p:sld xmlns:a="http://schemas.openxmlformats.org/drawingml/2006/main" xmlns:r="http://schemas.openxmlformats.org/officeDocument/2006/relationships" xmlns:p="http://schemas.openxmlformats.org/presentationml/2006/main">
+  <p:cSld>
+    <p:spTree>
+      <p:nvGrpSpPr>
+        <p:cNvPr id="1" name=""/>
+        <p:cNvGrpSpPr/>
+        <p:nvPr/>
+      </p:nvGrpSpPr>
+      <p:grpSpPr>
+        <a:xfrm>
+          <a:off x="0" y="0"/>
+          <a:ext cx="0" cy="0"/>
+          <a:chOff x="0" y="0"/>
+          <a:chExt cx="0" cy="0"/>
+        </a:xfrm>
+      </p:grpSpPr>
+      <p:sp>
+        <p:nvSpPr>
+          <p:cNvPr id="2" name="Title 1">
+            <a:extLst>
+              <a:ext uri="{FF2B5EF4-FFF2-40B4-BE49-F238E27FC236}">
+                <a16:creationId xmlns:a16="http://schemas.microsoft.com/office/drawing/2014/main" id="{61A172E7-5A50-8851-C700-ADDE80C3674F}"/>
+              </a:ext>
+            </a:extLst>
+          </p:cNvPr>
+          <p:cNvSpPr>
+            <a:spLocks noGrp="1"/>
+          </p:cNvSpPr>
+          <p:nvPr>
+            <p:ph type="title"/>
+          </p:nvPr>
+        </p:nvSpPr>
+        <p:spPr/>
+        <p:txBody>
+          <a:bodyPr/>
+          <a:lstStyle/>
+          <a:p>
+            <a:r>
+              <a:rPr lang="en-US" dirty="0"/>
+              <a:t>Model Evaluation - CNN</a:t>
+            </a:r>
+          </a:p>
+        </p:txBody>
+      </p:sp>
+      <p:pic>
+        <p:nvPicPr>
+          <p:cNvPr id="8" name="Content Placeholder 7">
+            <a:extLst>
+              <a:ext uri="{FF2B5EF4-FFF2-40B4-BE49-F238E27FC236}">
+                <a16:creationId xmlns:a16="http://schemas.microsoft.com/office/drawing/2014/main" id="{4E52E101-9D65-0A37-31C7-9866F4989C11}"/>
+              </a:ext>
+            </a:extLst>
+          </p:cNvPr>
+          <p:cNvPicPr>
+            <a:picLocks noGrp="1" noChangeAspect="1"/>
+          </p:cNvPicPr>
+          <p:nvPr>
+            <p:ph idx="1"/>
+          </p:nvPr>
+        </p:nvPicPr>
+        <p:blipFill>
+          <a:blip r:embed="rId2"/>
+          <a:stretch>
+            <a:fillRect/>
+          </a:stretch>
+        </p:blipFill>
+        <p:spPr>
+          <a:xfrm>
+            <a:off x="2231136" y="2325932"/>
+            <a:ext cx="3632200" cy="2882900"/>
+          </a:xfrm>
+          <a:prstGeom prst="rect">
+            <a:avLst/>
+          </a:prstGeom>
+        </p:spPr>
+      </p:pic>
+      <p:pic>
+        <p:nvPicPr>
+          <p:cNvPr id="9" name="Picture 8">
+            <a:extLst>
+              <a:ext uri="{FF2B5EF4-FFF2-40B4-BE49-F238E27FC236}">
+                <a16:creationId xmlns:a16="http://schemas.microsoft.com/office/drawing/2014/main" id="{E6B5F84E-A8FF-E097-0FBF-5737C74AB1B7}"/>
+              </a:ext>
+            </a:extLst>
+          </p:cNvPr>
+          <p:cNvPicPr>
+            <a:picLocks noChangeAspect="1"/>
+          </p:cNvPicPr>
+          <p:nvPr/>
+        </p:nvPicPr>
+        <p:blipFill>
+          <a:blip r:embed="rId3"/>
+          <a:stretch>
+            <a:fillRect/>
+          </a:stretch>
+        </p:blipFill>
+        <p:spPr>
+          <a:xfrm>
+            <a:off x="6277864" y="3767382"/>
+            <a:ext cx="3683000" cy="2743200"/>
+          </a:xfrm>
+          <a:prstGeom prst="rect">
+            <a:avLst/>
+          </a:prstGeom>
+        </p:spPr>
+      </p:pic>
+      <p:sp>
+        <p:nvSpPr>
+          <p:cNvPr id="10" name="TextBox 9">
+            <a:extLst>
+              <a:ext uri="{FF2B5EF4-FFF2-40B4-BE49-F238E27FC236}">
+                <a16:creationId xmlns:a16="http://schemas.microsoft.com/office/drawing/2014/main" id="{6C3CCD30-4794-FD7D-EBD7-E0FE5A6F5057}"/>
+              </a:ext>
+            </a:extLst>
+          </p:cNvPr>
+          <p:cNvSpPr txBox="1"/>
+          <p:nvPr/>
+        </p:nvSpPr>
+        <p:spPr>
+          <a:xfrm>
+            <a:off x="1581989" y="5381352"/>
+            <a:ext cx="4332148" cy="1200329"/>
+          </a:xfrm>
+          <a:prstGeom prst="rect">
+            <a:avLst/>
+          </a:prstGeom>
+          <a:noFill/>
+        </p:spPr>
+        <p:txBody>
+          <a:bodyPr wrap="square" rtlCol="0">
+            <a:spAutoFit/>
+          </a:bodyPr>
+          <a:lstStyle/>
+          <a:p>
+            <a:pPr marL="285750" indent="-285750">
+              <a:buFont typeface="Arial" panose="020B0604020202020204" pitchFamily="34" charset="0"/>
+              <a:buChar char="•"/>
+            </a:pPr>
+            <a:r>
+              <a:rPr lang="en-US" dirty="0"/>
+              <a:t>Evaluating the loss functions, there is no clear sign of stabilization but it seems like there are brief moments of it when the loss functions converge </a:t>
+            </a:r>
+          </a:p>
+        </p:txBody>
+      </p:sp>
+      <p:sp>
+        <p:nvSpPr>
+          <p:cNvPr id="11" name="TextBox 10">
+            <a:extLst>
+              <a:ext uri="{FF2B5EF4-FFF2-40B4-BE49-F238E27FC236}">
+                <a16:creationId xmlns:a16="http://schemas.microsoft.com/office/drawing/2014/main" id="{2C3E0E7D-A274-53DA-289B-16F89CBF7F0D}"/>
+              </a:ext>
+            </a:extLst>
+          </p:cNvPr>
+          <p:cNvSpPr txBox="1"/>
+          <p:nvPr/>
+        </p:nvSpPr>
+        <p:spPr>
+          <a:xfrm>
+            <a:off x="6096000" y="2490453"/>
+            <a:ext cx="4911969" cy="1200329"/>
+          </a:xfrm>
+          <a:prstGeom prst="rect">
+            <a:avLst/>
+          </a:prstGeom>
+          <a:noFill/>
+        </p:spPr>
+        <p:txBody>
+          <a:bodyPr wrap="square" rtlCol="0">
+            <a:spAutoFit/>
+          </a:bodyPr>
+          <a:lstStyle/>
+          <a:p>
+            <a:pPr marL="285750" indent="-285750">
+              <a:buFont typeface="Arial" panose="020B0604020202020204" pitchFamily="34" charset="0"/>
+              <a:buChar char="•"/>
+            </a:pPr>
+            <a:r>
+              <a:rPr lang="en-US" dirty="0"/>
+              <a:t>Both training and validation accuracy generally seem to increase after each epoch, but the oscillations in the validation accuracy may indicate unstable learning</a:t>
+            </a:r>
+          </a:p>
+        </p:txBody>
+      </p:sp>
+    </p:spTree>
+    <p:extLst>
+      <p:ext uri="{BB962C8B-B14F-4D97-AF65-F5344CB8AC3E}">
+        <p14:creationId xmlns:p14="http://schemas.microsoft.com/office/powerpoint/2010/main" val="1223778235"/>
+      </p:ext>
+    </p:extLst>
+  </p:cSld>
+  <p:clrMapOvr>
+    <a:masterClrMapping/>
+  </p:clrMapOvr>
+</p:sld>
+</file>
+
+<file path=ppt/slides/slide19.xml><?xml version="1.0" encoding="utf-8"?>
+<p:sld xmlns:a="http://schemas.openxmlformats.org/drawingml/2006/main" xmlns:r="http://schemas.openxmlformats.org/officeDocument/2006/relationships" xmlns:p="http://schemas.openxmlformats.org/presentationml/2006/main">
+  <p:cSld>
+    <p:spTree>
+      <p:nvGrpSpPr>
+        <p:cNvPr id="1" name=""/>
+        <p:cNvGrpSpPr/>
+        <p:nvPr/>
+      </p:nvGrpSpPr>
+      <p:grpSpPr>
+        <a:xfrm>
+          <a:off x="0" y="0"/>
+          <a:ext cx="0" cy="0"/>
+          <a:chOff x="0" y="0"/>
+          <a:chExt cx="0" cy="0"/>
+        </a:xfrm>
+      </p:grpSpPr>
+      <p:sp>
+        <p:nvSpPr>
+          <p:cNvPr id="2" name="Title 1">
+            <a:extLst>
+              <a:ext uri="{FF2B5EF4-FFF2-40B4-BE49-F238E27FC236}">
+                <a16:creationId xmlns:a16="http://schemas.microsoft.com/office/drawing/2014/main" id="{61A172E7-5A50-8851-C700-ADDE80C3674F}"/>
+              </a:ext>
+            </a:extLst>
+          </p:cNvPr>
+          <p:cNvSpPr>
+            <a:spLocks noGrp="1"/>
+          </p:cNvSpPr>
+          <p:nvPr>
+            <p:ph type="title"/>
+          </p:nvPr>
+        </p:nvSpPr>
+        <p:spPr/>
+        <p:txBody>
+          <a:bodyPr/>
+          <a:lstStyle/>
+          <a:p>
+            <a:r>
+              <a:rPr lang="en-US" dirty="0"/>
+              <a:t>Machine Learning Model – VGG16</a:t>
+            </a:r>
+          </a:p>
+        </p:txBody>
+      </p:sp>
+      <p:sp>
+        <p:nvSpPr>
+          <p:cNvPr id="4" name="Content Placeholder 3">
+            <a:extLst>
+              <a:ext uri="{FF2B5EF4-FFF2-40B4-BE49-F238E27FC236}">
+                <a16:creationId xmlns:a16="http://schemas.microsoft.com/office/drawing/2014/main" id="{2235AECE-B968-8FEB-3813-167D5A2ADF47}"/>
+              </a:ext>
+            </a:extLst>
+          </p:cNvPr>
+          <p:cNvSpPr>
+            <a:spLocks noGrp="1"/>
+          </p:cNvSpPr>
+          <p:nvPr>
+            <p:ph idx="1"/>
+          </p:nvPr>
+        </p:nvSpPr>
+        <p:spPr/>
+        <p:txBody>
+          <a:bodyPr/>
+          <a:lstStyle/>
+          <a:p>
+            <a:r>
+              <a:rPr lang="en-US" dirty="0"/>
+              <a:t>VGG16 is a pretrained image classification CNN model that can be accessed through TensorFlow</a:t>
+            </a:r>
+          </a:p>
+          <a:p>
+            <a:pPr lvl="1"/>
+            <a:r>
+              <a:rPr lang="en-US" dirty="0"/>
+              <a:t>Pretrained on large datasets such as ImageNet </a:t>
+            </a:r>
+          </a:p>
+          <a:p>
+            <a:pPr lvl="1"/>
+            <a:r>
+              <a:rPr lang="en-US" dirty="0"/>
+              <a:t>16 layers (13 convoluted layers, 3 fully connected layers)</a:t>
+            </a:r>
+          </a:p>
+          <a:p>
+            <a:pPr lvl="1"/>
+            <a:r>
+              <a:rPr lang="en-US" dirty="0"/>
+              <a:t>Input layer designed to take in images of size (224, 224, 3) </a:t>
+            </a:r>
+          </a:p>
+          <a:p>
+            <a:pPr lvl="2"/>
+            <a:r>
+              <a:rPr lang="en-US" dirty="0"/>
+              <a:t>224x224 pixels with 3 color channels (RGB)</a:t>
+            </a:r>
+          </a:p>
+        </p:txBody>
+      </p:sp>
+    </p:spTree>
+    <p:extLst>
+      <p:ext uri="{BB962C8B-B14F-4D97-AF65-F5344CB8AC3E}">
+        <p14:creationId xmlns:p14="http://schemas.microsoft.com/office/powerpoint/2010/main" val="361976531"/>
       </p:ext>
     </p:extLst>
   </p:cSld>
@@ -4682,6 +5447,1059 @@
     <p:extLst>
       <p:ext uri="{BB962C8B-B14F-4D97-AF65-F5344CB8AC3E}">
         <p14:creationId xmlns:p14="http://schemas.microsoft.com/office/powerpoint/2010/main" val="2153715888"/>
+      </p:ext>
+    </p:extLst>
+  </p:cSld>
+  <p:clrMapOvr>
+    <a:masterClrMapping/>
+  </p:clrMapOvr>
+</p:sld>
+</file>
+
+<file path=ppt/slides/slide20.xml><?xml version="1.0" encoding="utf-8"?>
+<p:sld xmlns:a="http://schemas.openxmlformats.org/drawingml/2006/main" xmlns:r="http://schemas.openxmlformats.org/officeDocument/2006/relationships" xmlns:p="http://schemas.openxmlformats.org/presentationml/2006/main">
+  <p:cSld>
+    <p:spTree>
+      <p:nvGrpSpPr>
+        <p:cNvPr id="1" name=""/>
+        <p:cNvGrpSpPr/>
+        <p:nvPr/>
+      </p:nvGrpSpPr>
+      <p:grpSpPr>
+        <a:xfrm>
+          <a:off x="0" y="0"/>
+          <a:ext cx="0" cy="0"/>
+          <a:chOff x="0" y="0"/>
+          <a:chExt cx="0" cy="0"/>
+        </a:xfrm>
+      </p:grpSpPr>
+      <p:sp>
+        <p:nvSpPr>
+          <p:cNvPr id="2" name="Title 1">
+            <a:extLst>
+              <a:ext uri="{FF2B5EF4-FFF2-40B4-BE49-F238E27FC236}">
+                <a16:creationId xmlns:a16="http://schemas.microsoft.com/office/drawing/2014/main" id="{61A172E7-5A50-8851-C700-ADDE80C3674F}"/>
+              </a:ext>
+            </a:extLst>
+          </p:cNvPr>
+          <p:cNvSpPr>
+            <a:spLocks noGrp="1"/>
+          </p:cNvSpPr>
+          <p:nvPr>
+            <p:ph type="title"/>
+          </p:nvPr>
+        </p:nvSpPr>
+        <p:spPr/>
+        <p:txBody>
+          <a:bodyPr/>
+          <a:lstStyle/>
+          <a:p>
+            <a:r>
+              <a:rPr lang="en-US" dirty="0"/>
+              <a:t>Machine Learning Model – VGG16</a:t>
+            </a:r>
+          </a:p>
+        </p:txBody>
+      </p:sp>
+      <p:sp>
+        <p:nvSpPr>
+          <p:cNvPr id="4" name="Content Placeholder 3">
+            <a:extLst>
+              <a:ext uri="{FF2B5EF4-FFF2-40B4-BE49-F238E27FC236}">
+                <a16:creationId xmlns:a16="http://schemas.microsoft.com/office/drawing/2014/main" id="{2235AECE-B968-8FEB-3813-167D5A2ADF47}"/>
+              </a:ext>
+            </a:extLst>
+          </p:cNvPr>
+          <p:cNvSpPr>
+            <a:spLocks noGrp="1"/>
+          </p:cNvSpPr>
+          <p:nvPr>
+            <p:ph idx="1"/>
+          </p:nvPr>
+        </p:nvSpPr>
+        <p:spPr>
+          <a:xfrm>
+            <a:off x="2079205" y="2275772"/>
+            <a:ext cx="7729728" cy="3101983"/>
+          </a:xfrm>
+        </p:spPr>
+        <p:txBody>
+          <a:bodyPr/>
+          <a:lstStyle/>
+          <a:p>
+            <a:r>
+              <a:rPr lang="en-US" dirty="0"/>
+              <a:t>Our data consists of grayscale images of size (500, 500, 1), we must resize the images in preprocessing</a:t>
+            </a:r>
+          </a:p>
+          <a:p>
+            <a:pPr lvl="1"/>
+            <a:r>
+              <a:rPr lang="en-US" dirty="0"/>
+              <a:t>VGG16 is already computationally expansive, if we don’t resize training time takes longer</a:t>
+            </a:r>
+          </a:p>
+        </p:txBody>
+      </p:sp>
+      <p:pic>
+        <p:nvPicPr>
+          <p:cNvPr id="5" name="Picture 4" descr="A computer screen with colorful text&#10;&#10;Description automatically generated">
+            <a:extLst>
+              <a:ext uri="{FF2B5EF4-FFF2-40B4-BE49-F238E27FC236}">
+                <a16:creationId xmlns:a16="http://schemas.microsoft.com/office/drawing/2014/main" id="{FAECD28D-ACF6-BF8B-7037-A600B11753F6}"/>
+              </a:ext>
+            </a:extLst>
+          </p:cNvPr>
+          <p:cNvPicPr>
+            <a:picLocks noChangeAspect="1"/>
+          </p:cNvPicPr>
+          <p:nvPr/>
+        </p:nvPicPr>
+        <p:blipFill>
+          <a:blip r:embed="rId2"/>
+          <a:stretch>
+            <a:fillRect/>
+          </a:stretch>
+        </p:blipFill>
+        <p:spPr>
+          <a:xfrm>
+            <a:off x="2231136" y="3581804"/>
+            <a:ext cx="7881659" cy="3155819"/>
+          </a:xfrm>
+          <a:prstGeom prst="rect">
+            <a:avLst/>
+          </a:prstGeom>
+        </p:spPr>
+      </p:pic>
+    </p:spTree>
+    <p:extLst>
+      <p:ext uri="{BB962C8B-B14F-4D97-AF65-F5344CB8AC3E}">
+        <p14:creationId xmlns:p14="http://schemas.microsoft.com/office/powerpoint/2010/main" val="4060415921"/>
+      </p:ext>
+    </p:extLst>
+  </p:cSld>
+  <p:clrMapOvr>
+    <a:masterClrMapping/>
+  </p:clrMapOvr>
+</p:sld>
+</file>
+
+<file path=ppt/slides/slide21.xml><?xml version="1.0" encoding="utf-8"?>
+<p:sld xmlns:a="http://schemas.openxmlformats.org/drawingml/2006/main" xmlns:r="http://schemas.openxmlformats.org/officeDocument/2006/relationships" xmlns:p="http://schemas.openxmlformats.org/presentationml/2006/main">
+  <p:cSld>
+    <p:spTree>
+      <p:nvGrpSpPr>
+        <p:cNvPr id="1" name=""/>
+        <p:cNvGrpSpPr/>
+        <p:nvPr/>
+      </p:nvGrpSpPr>
+      <p:grpSpPr>
+        <a:xfrm>
+          <a:off x="0" y="0"/>
+          <a:ext cx="0" cy="0"/>
+          <a:chOff x="0" y="0"/>
+          <a:chExt cx="0" cy="0"/>
+        </a:xfrm>
+      </p:grpSpPr>
+      <p:sp>
+        <p:nvSpPr>
+          <p:cNvPr id="2" name="Title 1">
+            <a:extLst>
+              <a:ext uri="{FF2B5EF4-FFF2-40B4-BE49-F238E27FC236}">
+                <a16:creationId xmlns:a16="http://schemas.microsoft.com/office/drawing/2014/main" id="{61A172E7-5A50-8851-C700-ADDE80C3674F}"/>
+              </a:ext>
+            </a:extLst>
+          </p:cNvPr>
+          <p:cNvSpPr>
+            <a:spLocks noGrp="1"/>
+          </p:cNvSpPr>
+          <p:nvPr>
+            <p:ph type="title"/>
+          </p:nvPr>
+        </p:nvSpPr>
+        <p:spPr/>
+        <p:txBody>
+          <a:bodyPr/>
+          <a:lstStyle/>
+          <a:p>
+            <a:r>
+              <a:rPr lang="en-US" dirty="0"/>
+              <a:t>Machine Learning Model – VGG16</a:t>
+            </a:r>
+          </a:p>
+        </p:txBody>
+      </p:sp>
+      <p:pic>
+        <p:nvPicPr>
+          <p:cNvPr id="10" name="Content Placeholder 9" descr="A screen shot of a computer&#10;&#10;Description automatically generated">
+            <a:extLst>
+              <a:ext uri="{FF2B5EF4-FFF2-40B4-BE49-F238E27FC236}">
+                <a16:creationId xmlns:a16="http://schemas.microsoft.com/office/drawing/2014/main" id="{77986F58-E8A5-1D7C-50B6-BB9A7A64240E}"/>
+              </a:ext>
+            </a:extLst>
+          </p:cNvPr>
+          <p:cNvPicPr>
+            <a:picLocks noGrp="1" noChangeAspect="1"/>
+          </p:cNvPicPr>
+          <p:nvPr>
+            <p:ph idx="1"/>
+          </p:nvPr>
+        </p:nvPicPr>
+        <p:blipFill>
+          <a:blip r:embed="rId2"/>
+          <a:stretch>
+            <a:fillRect/>
+          </a:stretch>
+        </p:blipFill>
+        <p:spPr>
+          <a:xfrm>
+            <a:off x="1687734" y="2418777"/>
+            <a:ext cx="8816532" cy="2446300"/>
+          </a:xfrm>
+        </p:spPr>
+      </p:pic>
+      <p:sp>
+        <p:nvSpPr>
+          <p:cNvPr id="11" name="TextBox 10">
+            <a:extLst>
+              <a:ext uri="{FF2B5EF4-FFF2-40B4-BE49-F238E27FC236}">
+                <a16:creationId xmlns:a16="http://schemas.microsoft.com/office/drawing/2014/main" id="{D9FFFB90-CAB0-276F-C9FD-ACBBF8E184E1}"/>
+              </a:ext>
+            </a:extLst>
+          </p:cNvPr>
+          <p:cNvSpPr txBox="1"/>
+          <p:nvPr/>
+        </p:nvSpPr>
+        <p:spPr>
+          <a:xfrm>
+            <a:off x="1687734" y="5130442"/>
+            <a:ext cx="6305765" cy="923330"/>
+          </a:xfrm>
+          <a:prstGeom prst="rect">
+            <a:avLst/>
+          </a:prstGeom>
+          <a:noFill/>
+        </p:spPr>
+        <p:txBody>
+          <a:bodyPr wrap="none" rtlCol="0">
+            <a:spAutoFit/>
+          </a:bodyPr>
+          <a:lstStyle/>
+          <a:p>
+            <a:pPr marL="285750" indent="-285750">
+              <a:buFont typeface="Arial" panose="020B0604020202020204" pitchFamily="34" charset="0"/>
+              <a:buChar char="•"/>
+            </a:pPr>
+            <a:r>
+              <a:rPr lang="en-US" dirty="0"/>
+              <a:t>Load base model from TensorFlow without the top layers</a:t>
+            </a:r>
+          </a:p>
+          <a:p>
+            <a:pPr marL="285750" indent="-285750">
+              <a:buFont typeface="Arial" panose="020B0604020202020204" pitchFamily="34" charset="0"/>
+              <a:buChar char="•"/>
+            </a:pPr>
+            <a:r>
+              <a:rPr lang="en-US" dirty="0"/>
+              <a:t>Load the pretrained weights manually</a:t>
+            </a:r>
+          </a:p>
+          <a:p>
+            <a:pPr marL="285750" indent="-285750">
+              <a:buFont typeface="Arial" panose="020B0604020202020204" pitchFamily="34" charset="0"/>
+              <a:buChar char="•"/>
+            </a:pPr>
+            <a:r>
+              <a:rPr lang="en-US" dirty="0"/>
+              <a:t>Try to keep the top layers simple as we have a smaller dataset</a:t>
+            </a:r>
+          </a:p>
+        </p:txBody>
+      </p:sp>
+    </p:spTree>
+    <p:extLst>
+      <p:ext uri="{BB962C8B-B14F-4D97-AF65-F5344CB8AC3E}">
+        <p14:creationId xmlns:p14="http://schemas.microsoft.com/office/powerpoint/2010/main" val="1682966261"/>
+      </p:ext>
+    </p:extLst>
+  </p:cSld>
+  <p:clrMapOvr>
+    <a:masterClrMapping/>
+  </p:clrMapOvr>
+</p:sld>
+</file>
+
+<file path=ppt/slides/slide22.xml><?xml version="1.0" encoding="utf-8"?>
+<p:sld xmlns:a="http://schemas.openxmlformats.org/drawingml/2006/main" xmlns:r="http://schemas.openxmlformats.org/officeDocument/2006/relationships" xmlns:p="http://schemas.openxmlformats.org/presentationml/2006/main">
+  <p:cSld>
+    <p:spTree>
+      <p:nvGrpSpPr>
+        <p:cNvPr id="1" name=""/>
+        <p:cNvGrpSpPr/>
+        <p:nvPr/>
+      </p:nvGrpSpPr>
+      <p:grpSpPr>
+        <a:xfrm>
+          <a:off x="0" y="0"/>
+          <a:ext cx="0" cy="0"/>
+          <a:chOff x="0" y="0"/>
+          <a:chExt cx="0" cy="0"/>
+        </a:xfrm>
+      </p:grpSpPr>
+      <p:sp>
+        <p:nvSpPr>
+          <p:cNvPr id="2" name="Title 1">
+            <a:extLst>
+              <a:ext uri="{FF2B5EF4-FFF2-40B4-BE49-F238E27FC236}">
+                <a16:creationId xmlns:a16="http://schemas.microsoft.com/office/drawing/2014/main" id="{61A172E7-5A50-8851-C700-ADDE80C3674F}"/>
+              </a:ext>
+            </a:extLst>
+          </p:cNvPr>
+          <p:cNvSpPr>
+            <a:spLocks noGrp="1"/>
+          </p:cNvSpPr>
+          <p:nvPr>
+            <p:ph type="title"/>
+          </p:nvPr>
+        </p:nvSpPr>
+        <p:spPr/>
+        <p:txBody>
+          <a:bodyPr/>
+          <a:lstStyle/>
+          <a:p>
+            <a:r>
+              <a:rPr lang="en-US" dirty="0"/>
+              <a:t>Model Evaluation – VGG16</a:t>
+            </a:r>
+          </a:p>
+        </p:txBody>
+      </p:sp>
+      <p:pic>
+        <p:nvPicPr>
+          <p:cNvPr id="5" name="Content Placeholder 4">
+            <a:extLst>
+              <a:ext uri="{FF2B5EF4-FFF2-40B4-BE49-F238E27FC236}">
+                <a16:creationId xmlns:a16="http://schemas.microsoft.com/office/drawing/2014/main" id="{4E1775C7-B107-8FAF-393E-28CB8A535243}"/>
+              </a:ext>
+            </a:extLst>
+          </p:cNvPr>
+          <p:cNvPicPr>
+            <a:picLocks noGrp="1" noChangeAspect="1"/>
+          </p:cNvPicPr>
+          <p:nvPr>
+            <p:ph idx="1"/>
+          </p:nvPr>
+        </p:nvPicPr>
+        <p:blipFill>
+          <a:blip r:embed="rId2"/>
+          <a:stretch>
+            <a:fillRect/>
+          </a:stretch>
+        </p:blipFill>
+        <p:spPr>
+          <a:xfrm>
+            <a:off x="632836" y="2626702"/>
+            <a:ext cx="4506974" cy="3797544"/>
+          </a:xfrm>
+          <a:prstGeom prst="rect">
+            <a:avLst/>
+          </a:prstGeom>
+        </p:spPr>
+      </p:pic>
+      <p:pic>
+        <p:nvPicPr>
+          <p:cNvPr id="7" name="Picture 6">
+            <a:extLst>
+              <a:ext uri="{FF2B5EF4-FFF2-40B4-BE49-F238E27FC236}">
+                <a16:creationId xmlns:a16="http://schemas.microsoft.com/office/drawing/2014/main" id="{D10ADFF3-3610-C7BD-07C1-D240269C75E4}"/>
+              </a:ext>
+            </a:extLst>
+          </p:cNvPr>
+          <p:cNvPicPr>
+            <a:picLocks noChangeAspect="1"/>
+          </p:cNvPicPr>
+          <p:nvPr/>
+        </p:nvPicPr>
+        <p:blipFill>
+          <a:blip r:embed="rId3"/>
+          <a:stretch>
+            <a:fillRect/>
+          </a:stretch>
+        </p:blipFill>
+        <p:spPr>
+          <a:xfrm>
+            <a:off x="5896708" y="2626702"/>
+            <a:ext cx="4483175" cy="1605329"/>
+          </a:xfrm>
+          <a:prstGeom prst="rect">
+            <a:avLst/>
+          </a:prstGeom>
+        </p:spPr>
+      </p:pic>
+      <p:sp>
+        <p:nvSpPr>
+          <p:cNvPr id="10" name="TextBox 9">
+            <a:extLst>
+              <a:ext uri="{FF2B5EF4-FFF2-40B4-BE49-F238E27FC236}">
+                <a16:creationId xmlns:a16="http://schemas.microsoft.com/office/drawing/2014/main" id="{F1069344-30F9-B73B-31E7-55EF81EF6CED}"/>
+              </a:ext>
+            </a:extLst>
+          </p:cNvPr>
+          <p:cNvSpPr txBox="1"/>
+          <p:nvPr/>
+        </p:nvSpPr>
+        <p:spPr>
+          <a:xfrm>
+            <a:off x="5414432" y="4525474"/>
+            <a:ext cx="6332091" cy="1477328"/>
+          </a:xfrm>
+          <a:prstGeom prst="rect">
+            <a:avLst/>
+          </a:prstGeom>
+          <a:noFill/>
+        </p:spPr>
+        <p:txBody>
+          <a:bodyPr wrap="square" rtlCol="0">
+            <a:spAutoFit/>
+          </a:bodyPr>
+          <a:lstStyle/>
+          <a:p>
+            <a:pPr marL="285750" indent="-285750">
+              <a:buFont typeface="Arial" panose="020B0604020202020204" pitchFamily="34" charset="0"/>
+              <a:buChar char="•"/>
+            </a:pPr>
+            <a:r>
+              <a:rPr lang="en-US" dirty="0"/>
+              <a:t>Most runs stayed between 50-60% accuracy</a:t>
+            </a:r>
+          </a:p>
+          <a:p>
+            <a:pPr marL="285750" indent="-285750">
+              <a:buFont typeface="Arial" panose="020B0604020202020204" pitchFamily="34" charset="0"/>
+              <a:buChar char="•"/>
+            </a:pPr>
+            <a:r>
+              <a:rPr lang="en-US" dirty="0"/>
+              <a:t>Overall performance not great</a:t>
+            </a:r>
+          </a:p>
+          <a:p>
+            <a:pPr marL="742950" lvl="1" indent="-285750">
+              <a:buFont typeface="Arial" panose="020B0604020202020204" pitchFamily="34" charset="0"/>
+              <a:buChar char="•"/>
+            </a:pPr>
+            <a:r>
+              <a:rPr lang="en-US" dirty="0"/>
+              <a:t>This may be because our dataset is small which makes the model prone to overfitting</a:t>
+            </a:r>
+          </a:p>
+          <a:p>
+            <a:pPr marL="742950" lvl="1" indent="-285750">
+              <a:buFont typeface="Arial" panose="020B0604020202020204" pitchFamily="34" charset="0"/>
+              <a:buChar char="•"/>
+            </a:pPr>
+            <a:r>
+              <a:rPr lang="en-US" dirty="0"/>
+              <a:t>VGG16 was pretrained on images with 3 color channels</a:t>
+            </a:r>
+          </a:p>
+        </p:txBody>
+      </p:sp>
+    </p:spTree>
+    <p:extLst>
+      <p:ext uri="{BB962C8B-B14F-4D97-AF65-F5344CB8AC3E}">
+        <p14:creationId xmlns:p14="http://schemas.microsoft.com/office/powerpoint/2010/main" val="968493480"/>
+      </p:ext>
+    </p:extLst>
+  </p:cSld>
+  <p:clrMapOvr>
+    <a:masterClrMapping/>
+  </p:clrMapOvr>
+</p:sld>
+</file>
+
+<file path=ppt/slides/slide23.xml><?xml version="1.0" encoding="utf-8"?>
+<p:sld xmlns:a="http://schemas.openxmlformats.org/drawingml/2006/main" xmlns:r="http://schemas.openxmlformats.org/officeDocument/2006/relationships" xmlns:p="http://schemas.openxmlformats.org/presentationml/2006/main">
+  <p:cSld>
+    <p:spTree>
+      <p:nvGrpSpPr>
+        <p:cNvPr id="1" name=""/>
+        <p:cNvGrpSpPr/>
+        <p:nvPr/>
+      </p:nvGrpSpPr>
+      <p:grpSpPr>
+        <a:xfrm>
+          <a:off x="0" y="0"/>
+          <a:ext cx="0" cy="0"/>
+          <a:chOff x="0" y="0"/>
+          <a:chExt cx="0" cy="0"/>
+        </a:xfrm>
+      </p:grpSpPr>
+      <p:sp>
+        <p:nvSpPr>
+          <p:cNvPr id="2" name="Title 1">
+            <a:extLst>
+              <a:ext uri="{FF2B5EF4-FFF2-40B4-BE49-F238E27FC236}">
+                <a16:creationId xmlns:a16="http://schemas.microsoft.com/office/drawing/2014/main" id="{61A172E7-5A50-8851-C700-ADDE80C3674F}"/>
+              </a:ext>
+            </a:extLst>
+          </p:cNvPr>
+          <p:cNvSpPr>
+            <a:spLocks noGrp="1"/>
+          </p:cNvSpPr>
+          <p:nvPr>
+            <p:ph type="title"/>
+          </p:nvPr>
+        </p:nvSpPr>
+        <p:spPr/>
+        <p:txBody>
+          <a:bodyPr/>
+          <a:lstStyle/>
+          <a:p>
+            <a:r>
+              <a:rPr lang="en-US" dirty="0"/>
+              <a:t>Model Evaluation – VGG16</a:t>
+            </a:r>
+          </a:p>
+        </p:txBody>
+      </p:sp>
+      <p:pic>
+        <p:nvPicPr>
+          <p:cNvPr id="3" name="Content Placeholder 2">
+            <a:extLst>
+              <a:ext uri="{FF2B5EF4-FFF2-40B4-BE49-F238E27FC236}">
+                <a16:creationId xmlns:a16="http://schemas.microsoft.com/office/drawing/2014/main" id="{9C8649E4-EBFB-B612-018A-35690C3A3A89}"/>
+              </a:ext>
+            </a:extLst>
+          </p:cNvPr>
+          <p:cNvPicPr>
+            <a:picLocks noGrp="1" noChangeAspect="1"/>
+          </p:cNvPicPr>
+          <p:nvPr>
+            <p:ph idx="1"/>
+          </p:nvPr>
+        </p:nvPicPr>
+        <p:blipFill>
+          <a:blip r:embed="rId2"/>
+          <a:stretch>
+            <a:fillRect/>
+          </a:stretch>
+        </p:blipFill>
+        <p:spPr>
+          <a:xfrm>
+            <a:off x="1742831" y="2251639"/>
+            <a:ext cx="3657600" cy="2882900"/>
+          </a:xfrm>
+          <a:prstGeom prst="rect">
+            <a:avLst/>
+          </a:prstGeom>
+        </p:spPr>
+      </p:pic>
+      <p:pic>
+        <p:nvPicPr>
+          <p:cNvPr id="5" name="Picture 4">
+            <a:extLst>
+              <a:ext uri="{FF2B5EF4-FFF2-40B4-BE49-F238E27FC236}">
+                <a16:creationId xmlns:a16="http://schemas.microsoft.com/office/drawing/2014/main" id="{9D458D89-2148-68BF-3197-42FF4A753CD2}"/>
+              </a:ext>
+            </a:extLst>
+          </p:cNvPr>
+          <p:cNvPicPr>
+            <a:picLocks noChangeAspect="1"/>
+          </p:cNvPicPr>
+          <p:nvPr/>
+        </p:nvPicPr>
+        <p:blipFill>
+          <a:blip r:embed="rId3"/>
+          <a:stretch>
+            <a:fillRect/>
+          </a:stretch>
+        </p:blipFill>
+        <p:spPr>
+          <a:xfrm>
+            <a:off x="7188982" y="3861167"/>
+            <a:ext cx="3708400" cy="2743200"/>
+          </a:xfrm>
+          <a:prstGeom prst="rect">
+            <a:avLst/>
+          </a:prstGeom>
+        </p:spPr>
+      </p:pic>
+      <p:sp>
+        <p:nvSpPr>
+          <p:cNvPr id="6" name="TextBox 5">
+            <a:extLst>
+              <a:ext uri="{FF2B5EF4-FFF2-40B4-BE49-F238E27FC236}">
+                <a16:creationId xmlns:a16="http://schemas.microsoft.com/office/drawing/2014/main" id="{C76D3BB1-9DBD-8D8E-8831-50C5DCEEEE5D}"/>
+              </a:ext>
+            </a:extLst>
+          </p:cNvPr>
+          <p:cNvSpPr txBox="1"/>
+          <p:nvPr/>
+        </p:nvSpPr>
+        <p:spPr>
+          <a:xfrm>
+            <a:off x="1650219" y="5404038"/>
+            <a:ext cx="5064370" cy="1200329"/>
+          </a:xfrm>
+          <a:prstGeom prst="rect">
+            <a:avLst/>
+          </a:prstGeom>
+          <a:noFill/>
+        </p:spPr>
+        <p:txBody>
+          <a:bodyPr wrap="square" rtlCol="0">
+            <a:spAutoFit/>
+          </a:bodyPr>
+          <a:lstStyle/>
+          <a:p>
+            <a:pPr marL="285750" indent="-285750">
+              <a:buFont typeface="Arial" panose="020B0604020202020204" pitchFamily="34" charset="0"/>
+              <a:buChar char="•"/>
+            </a:pPr>
+            <a:r>
+              <a:rPr lang="en-US" dirty="0"/>
+              <a:t>Evaluating the loss functions, it looks like the training process may be unstable</a:t>
+            </a:r>
+          </a:p>
+          <a:p>
+            <a:pPr marL="742950" lvl="1" indent="-285750">
+              <a:buFont typeface="Arial" panose="020B0604020202020204" pitchFamily="34" charset="0"/>
+              <a:buChar char="•"/>
+            </a:pPr>
+            <a:r>
+              <a:rPr lang="en-US" dirty="0"/>
+              <a:t>This may be because our dataset is too small for a complex model like VGG16</a:t>
+            </a:r>
+          </a:p>
+        </p:txBody>
+      </p:sp>
+      <p:sp>
+        <p:nvSpPr>
+          <p:cNvPr id="8" name="TextBox 7">
+            <a:extLst>
+              <a:ext uri="{FF2B5EF4-FFF2-40B4-BE49-F238E27FC236}">
+                <a16:creationId xmlns:a16="http://schemas.microsoft.com/office/drawing/2014/main" id="{1C82F794-0806-1B43-6760-E1BFD749AAC4}"/>
+              </a:ext>
+            </a:extLst>
+          </p:cNvPr>
+          <p:cNvSpPr txBox="1"/>
+          <p:nvPr/>
+        </p:nvSpPr>
+        <p:spPr>
+          <a:xfrm>
+            <a:off x="6714589" y="2637692"/>
+            <a:ext cx="4572000" cy="923330"/>
+          </a:xfrm>
+          <a:prstGeom prst="rect">
+            <a:avLst/>
+          </a:prstGeom>
+          <a:noFill/>
+        </p:spPr>
+        <p:txBody>
+          <a:bodyPr wrap="square" rtlCol="0">
+            <a:spAutoFit/>
+          </a:bodyPr>
+          <a:lstStyle/>
+          <a:p>
+            <a:pPr marL="285750" indent="-285750">
+              <a:buFont typeface="Arial" panose="020B0604020202020204" pitchFamily="34" charset="0"/>
+              <a:buChar char="•"/>
+            </a:pPr>
+            <a:r>
+              <a:rPr lang="en-US" dirty="0"/>
+              <a:t>The dramatic increase in validation accuracy before dropping back down and plateauing may indicate instability</a:t>
+            </a:r>
+          </a:p>
+        </p:txBody>
+      </p:sp>
+    </p:spTree>
+    <p:extLst>
+      <p:ext uri="{BB962C8B-B14F-4D97-AF65-F5344CB8AC3E}">
+        <p14:creationId xmlns:p14="http://schemas.microsoft.com/office/powerpoint/2010/main" val="2198635957"/>
+      </p:ext>
+    </p:extLst>
+  </p:cSld>
+  <p:clrMapOvr>
+    <a:masterClrMapping/>
+  </p:clrMapOvr>
+</p:sld>
+</file>
+
+<file path=ppt/slides/slide24.xml><?xml version="1.0" encoding="utf-8"?>
+<p:sld xmlns:a="http://schemas.openxmlformats.org/drawingml/2006/main" xmlns:r="http://schemas.openxmlformats.org/officeDocument/2006/relationships" xmlns:p="http://schemas.openxmlformats.org/presentationml/2006/main">
+  <p:cSld>
+    <p:spTree>
+      <p:nvGrpSpPr>
+        <p:cNvPr id="1" name=""/>
+        <p:cNvGrpSpPr/>
+        <p:nvPr/>
+      </p:nvGrpSpPr>
+      <p:grpSpPr>
+        <a:xfrm>
+          <a:off x="0" y="0"/>
+          <a:ext cx="0" cy="0"/>
+          <a:chOff x="0" y="0"/>
+          <a:chExt cx="0" cy="0"/>
+        </a:xfrm>
+      </p:grpSpPr>
+      <p:sp>
+        <p:nvSpPr>
+          <p:cNvPr id="2" name="Title 1">
+            <a:extLst>
+              <a:ext uri="{FF2B5EF4-FFF2-40B4-BE49-F238E27FC236}">
+                <a16:creationId xmlns:a16="http://schemas.microsoft.com/office/drawing/2014/main" id="{7E936560-1091-EE3D-1B99-85B2E7C372F1}"/>
+              </a:ext>
+            </a:extLst>
+          </p:cNvPr>
+          <p:cNvSpPr>
+            <a:spLocks noGrp="1"/>
+          </p:cNvSpPr>
+          <p:nvPr>
+            <p:ph type="title"/>
+          </p:nvPr>
+        </p:nvSpPr>
+        <p:spPr/>
+        <p:txBody>
+          <a:bodyPr/>
+          <a:lstStyle/>
+          <a:p>
+            <a:r>
+              <a:rPr lang="en-US" dirty="0"/>
+              <a:t>Future Works</a:t>
+            </a:r>
+          </a:p>
+        </p:txBody>
+      </p:sp>
+      <p:sp>
+        <p:nvSpPr>
+          <p:cNvPr id="3" name="Content Placeholder 2">
+            <a:extLst>
+              <a:ext uri="{FF2B5EF4-FFF2-40B4-BE49-F238E27FC236}">
+                <a16:creationId xmlns:a16="http://schemas.microsoft.com/office/drawing/2014/main" id="{98756A12-9B7B-1A00-E2F4-F63FD1625FC2}"/>
+              </a:ext>
+            </a:extLst>
+          </p:cNvPr>
+          <p:cNvSpPr>
+            <a:spLocks noGrp="1"/>
+          </p:cNvSpPr>
+          <p:nvPr>
+            <p:ph idx="1"/>
+          </p:nvPr>
+        </p:nvSpPr>
+        <p:spPr/>
+        <p:txBody>
+          <a:bodyPr/>
+          <a:lstStyle/>
+          <a:p>
+            <a:r>
+              <a:rPr lang="en-US" dirty="0"/>
+              <a:t>Increase dataset size and diversity</a:t>
+            </a:r>
+          </a:p>
+          <a:p>
+            <a:pPr lvl="1"/>
+            <a:r>
+              <a:rPr lang="en-US" dirty="0"/>
+              <a:t>A larger dataset may allow CNN models to achieve learning stability, increasing overall performance</a:t>
+            </a:r>
+          </a:p>
+          <a:p>
+            <a:pPr lvl="1"/>
+            <a:r>
+              <a:rPr lang="en-US" dirty="0"/>
+              <a:t>This would particularly be useful while applying the VGG16 model, as it is more computationally expansive and was pretrained on larger datasets</a:t>
+            </a:r>
+          </a:p>
+          <a:p>
+            <a:pPr lvl="1"/>
+            <a:r>
+              <a:rPr lang="en-US" dirty="0"/>
+              <a:t>For CNN models built from scratch, more layers, filters, and neurons may need to be added to increase complexity, ensuring that the intricate features and patterns of a large and diverse dataset are captured</a:t>
+            </a:r>
+          </a:p>
+        </p:txBody>
+      </p:sp>
+    </p:spTree>
+    <p:extLst>
+      <p:ext uri="{BB962C8B-B14F-4D97-AF65-F5344CB8AC3E}">
+        <p14:creationId xmlns:p14="http://schemas.microsoft.com/office/powerpoint/2010/main" val="1365913255"/>
+      </p:ext>
+    </p:extLst>
+  </p:cSld>
+  <p:clrMapOvr>
+    <a:masterClrMapping/>
+  </p:clrMapOvr>
+</p:sld>
+</file>
+
+<file path=ppt/slides/slide25.xml><?xml version="1.0" encoding="utf-8"?>
+<p:sld xmlns:a="http://schemas.openxmlformats.org/drawingml/2006/main" xmlns:r="http://schemas.openxmlformats.org/officeDocument/2006/relationships" xmlns:p="http://schemas.openxmlformats.org/presentationml/2006/main">
+  <p:cSld>
+    <p:spTree>
+      <p:nvGrpSpPr>
+        <p:cNvPr id="1" name=""/>
+        <p:cNvGrpSpPr/>
+        <p:nvPr/>
+      </p:nvGrpSpPr>
+      <p:grpSpPr>
+        <a:xfrm>
+          <a:off x="0" y="0"/>
+          <a:ext cx="0" cy="0"/>
+          <a:chOff x="0" y="0"/>
+          <a:chExt cx="0" cy="0"/>
+        </a:xfrm>
+      </p:grpSpPr>
+      <p:sp>
+        <p:nvSpPr>
+          <p:cNvPr id="2" name="Title 1">
+            <a:extLst>
+              <a:ext uri="{FF2B5EF4-FFF2-40B4-BE49-F238E27FC236}">
+                <a16:creationId xmlns:a16="http://schemas.microsoft.com/office/drawing/2014/main" id="{40B4BF6D-6144-2878-CAA9-AC1A6E32EC1D}"/>
+              </a:ext>
+            </a:extLst>
+          </p:cNvPr>
+          <p:cNvSpPr>
+            <a:spLocks noGrp="1"/>
+          </p:cNvSpPr>
+          <p:nvPr>
+            <p:ph type="title"/>
+          </p:nvPr>
+        </p:nvSpPr>
+        <p:spPr/>
+        <p:txBody>
+          <a:bodyPr/>
+          <a:lstStyle/>
+          <a:p>
+            <a:r>
+              <a:rPr lang="en-US" dirty="0"/>
+              <a:t>Conclusion</a:t>
+            </a:r>
+          </a:p>
+        </p:txBody>
+      </p:sp>
+      <p:sp>
+        <p:nvSpPr>
+          <p:cNvPr id="3" name="Content Placeholder 2">
+            <a:extLst>
+              <a:ext uri="{FF2B5EF4-FFF2-40B4-BE49-F238E27FC236}">
+                <a16:creationId xmlns:a16="http://schemas.microsoft.com/office/drawing/2014/main" id="{6E42F117-53C3-B813-2AC6-FCB6ECC51B60}"/>
+              </a:ext>
+            </a:extLst>
+          </p:cNvPr>
+          <p:cNvSpPr>
+            <a:spLocks noGrp="1"/>
+          </p:cNvSpPr>
+          <p:nvPr>
+            <p:ph idx="1"/>
+          </p:nvPr>
+        </p:nvSpPr>
+        <p:spPr/>
+        <p:txBody>
+          <a:bodyPr/>
+          <a:lstStyle/>
+          <a:p>
+            <a:endParaRPr lang="en-US"/>
+          </a:p>
+        </p:txBody>
+      </p:sp>
+    </p:spTree>
+    <p:extLst>
+      <p:ext uri="{BB962C8B-B14F-4D97-AF65-F5344CB8AC3E}">
+        <p14:creationId xmlns:p14="http://schemas.microsoft.com/office/powerpoint/2010/main" val="2639777028"/>
+      </p:ext>
+    </p:extLst>
+  </p:cSld>
+  <p:clrMapOvr>
+    <a:masterClrMapping/>
+  </p:clrMapOvr>
+</p:sld>
+</file>
+
+<file path=ppt/slides/slide26.xml><?xml version="1.0" encoding="utf-8"?>
+<p:sld xmlns:a="http://schemas.openxmlformats.org/drawingml/2006/main" xmlns:r="http://schemas.openxmlformats.org/officeDocument/2006/relationships" xmlns:p="http://schemas.openxmlformats.org/presentationml/2006/main">
+  <p:cSld>
+    <p:spTree>
+      <p:nvGrpSpPr>
+        <p:cNvPr id="1" name=""/>
+        <p:cNvGrpSpPr/>
+        <p:nvPr/>
+      </p:nvGrpSpPr>
+      <p:grpSpPr>
+        <a:xfrm>
+          <a:off x="0" y="0"/>
+          <a:ext cx="0" cy="0"/>
+          <a:chOff x="0" y="0"/>
+          <a:chExt cx="0" cy="0"/>
+        </a:xfrm>
+      </p:grpSpPr>
+      <p:sp>
+        <p:nvSpPr>
+          <p:cNvPr id="7" name="Title 1">
+            <a:extLst>
+              <a:ext uri="{FF2B5EF4-FFF2-40B4-BE49-F238E27FC236}">
+                <a16:creationId xmlns:a16="http://schemas.microsoft.com/office/drawing/2014/main" id="{2958DF31-9AD7-6A84-2795-8AA3925283AB}"/>
+              </a:ext>
+            </a:extLst>
+          </p:cNvPr>
+          <p:cNvSpPr txBox="1">
+            <a:spLocks/>
+          </p:cNvSpPr>
+          <p:nvPr/>
+        </p:nvSpPr>
+        <p:spPr bwMode="blackWhite">
+          <a:xfrm>
+            <a:off x="690813" y="1058779"/>
+            <a:ext cx="10810373" cy="4308656"/>
+          </a:xfrm>
+          <a:prstGeom prst="rect">
+            <a:avLst/>
+          </a:prstGeom>
+          <a:solidFill>
+            <a:srgbClr val="FFFFFF">
+              <a:alpha val="10000"/>
+            </a:srgbClr>
+          </a:solidFill>
+          <a:ln w="38100" cap="sq">
+            <a:solidFill>
+              <a:srgbClr val="FFFFFF">
+                <a:alpha val="10000"/>
+              </a:srgbClr>
+            </a:solidFill>
+            <a:miter lim="800000"/>
+          </a:ln>
+        </p:spPr>
+        <p:txBody>
+          <a:bodyPr vert="horz" lIns="274320" tIns="182880" rIns="274320" bIns="182880" rtlCol="0" anchor="ctr" anchorCtr="1">
+            <a:normAutofit/>
+          </a:bodyPr>
+          <a:lstStyle>
+            <a:lvl1pPr algn="ctr" defTabSz="914400" rtl="0" eaLnBrk="1" latinLnBrk="0" hangingPunct="1">
+              <a:lnSpc>
+                <a:spcPct val="90000"/>
+              </a:lnSpc>
+              <a:spcBef>
+                <a:spcPct val="0"/>
+              </a:spcBef>
+              <a:buNone/>
+              <a:defRPr sz="3800" kern="1200" cap="all" spc="200" baseline="0">
+                <a:solidFill>
+                  <a:srgbClr val="262626"/>
+                </a:solidFill>
+                <a:latin typeface="+mj-lt"/>
+                <a:ea typeface="+mj-ea"/>
+                <a:cs typeface="+mj-cs"/>
+              </a:defRPr>
+            </a:lvl1pPr>
+          </a:lstStyle>
+          <a:p>
+            <a:endParaRPr lang="en-US" dirty="0"/>
+          </a:p>
+        </p:txBody>
+      </p:sp>
+      <p:sp>
+        <p:nvSpPr>
+          <p:cNvPr id="2" name="Title 1">
+            <a:extLst>
+              <a:ext uri="{FF2B5EF4-FFF2-40B4-BE49-F238E27FC236}">
+                <a16:creationId xmlns:a16="http://schemas.microsoft.com/office/drawing/2014/main" id="{AF755AED-A382-72F6-C59E-B4E1FC1F9AF7}"/>
+              </a:ext>
+            </a:extLst>
+          </p:cNvPr>
+          <p:cNvSpPr>
+            <a:spLocks noGrp="1"/>
+          </p:cNvSpPr>
+          <p:nvPr>
+            <p:ph type="ctrTitle"/>
+          </p:nvPr>
+        </p:nvSpPr>
+        <p:spPr>
+          <a:ln w="76200">
+            <a:solidFill>
+              <a:srgbClr val="272727"/>
+            </a:solidFill>
+          </a:ln>
+        </p:spPr>
+        <p:txBody>
+          <a:bodyPr/>
+          <a:lstStyle/>
+          <a:p>
+            <a:r>
+              <a:rPr lang="en-US" dirty="0"/>
+              <a:t>Thank You</a:t>
+            </a:r>
+          </a:p>
+        </p:txBody>
+      </p:sp>
+      <p:sp>
+        <p:nvSpPr>
+          <p:cNvPr id="8" name="Title 1">
+            <a:extLst>
+              <a:ext uri="{FF2B5EF4-FFF2-40B4-BE49-F238E27FC236}">
+                <a16:creationId xmlns:a16="http://schemas.microsoft.com/office/drawing/2014/main" id="{869F5907-3DE9-96AA-5726-6D064EAF0140}"/>
+              </a:ext>
+            </a:extLst>
+          </p:cNvPr>
+          <p:cNvSpPr txBox="1">
+            <a:spLocks/>
+          </p:cNvSpPr>
+          <p:nvPr/>
+        </p:nvSpPr>
+        <p:spPr bwMode="blackWhite">
+          <a:xfrm>
+            <a:off x="1227221" y="2054125"/>
+            <a:ext cx="9781674" cy="2311158"/>
+          </a:xfrm>
+          <a:prstGeom prst="rect">
+            <a:avLst/>
+          </a:prstGeom>
+          <a:solidFill>
+            <a:srgbClr val="FFFFFF">
+              <a:alpha val="10000"/>
+            </a:srgbClr>
+          </a:solidFill>
+          <a:ln w="38100" cap="sq">
+            <a:solidFill>
+              <a:srgbClr val="FFFFFF">
+                <a:alpha val="10000"/>
+              </a:srgbClr>
+            </a:solidFill>
+            <a:miter lim="800000"/>
+          </a:ln>
+        </p:spPr>
+        <p:txBody>
+          <a:bodyPr vert="horz" lIns="274320" tIns="182880" rIns="274320" bIns="182880" rtlCol="0" anchor="ctr" anchorCtr="1">
+            <a:normAutofit/>
+          </a:bodyPr>
+          <a:lstStyle>
+            <a:lvl1pPr algn="ctr" defTabSz="914400" rtl="0" eaLnBrk="1" latinLnBrk="0" hangingPunct="1">
+              <a:lnSpc>
+                <a:spcPct val="90000"/>
+              </a:lnSpc>
+              <a:spcBef>
+                <a:spcPct val="0"/>
+              </a:spcBef>
+              <a:buNone/>
+              <a:defRPr sz="3800" kern="1200" cap="all" spc="200" baseline="0">
+                <a:solidFill>
+                  <a:srgbClr val="262626"/>
+                </a:solidFill>
+                <a:latin typeface="+mj-lt"/>
+                <a:ea typeface="+mj-ea"/>
+                <a:cs typeface="+mj-cs"/>
+              </a:defRPr>
+            </a:lvl1pPr>
+          </a:lstStyle>
+          <a:p>
+            <a:endParaRPr lang="en-US" dirty="0"/>
+          </a:p>
+        </p:txBody>
+      </p:sp>
+    </p:spTree>
+    <p:extLst>
+      <p:ext uri="{BB962C8B-B14F-4D97-AF65-F5344CB8AC3E}">
+        <p14:creationId xmlns:p14="http://schemas.microsoft.com/office/powerpoint/2010/main" val="2719211162"/>
       </p:ext>
     </p:extLst>
   </p:cSld>

</xml_diff>